<commit_message>
Updated lesson 6 slides Added Linq sample
</commit_message>
<xml_diff>
--- a/Lesson 6/Lesson 6.pptx
+++ b/Lesson 6/Lesson 6.pptx
@@ -21,7 +21,8 @@
     <p:sldId id="289" r:id="rId15"/>
     <p:sldId id="274" r:id="rId16"/>
     <p:sldId id="290" r:id="rId17"/>
-    <p:sldId id="279" r:id="rId18"/>
+    <p:sldId id="291" r:id="rId18"/>
+    <p:sldId id="279" r:id="rId19"/>
   </p:sldIdLst>
   <p:sldSz cx="12192000" cy="6858000"/>
   <p:notesSz cx="6858000" cy="9144000"/>
@@ -277,7 +278,7 @@
           <a:p>
             <a:fld id="{C98C20DD-DDF2-4778-AC95-E3D9ED93958D}" type="datetimeFigureOut">
               <a:rPr lang="en-GB" smtClean="0"/>
-              <a:t>08/04/2018</a:t>
+              <a:t>09/04/2018</a:t>
             </a:fld>
             <a:endParaRPr lang="en-GB" dirty="0"/>
           </a:p>
@@ -477,7 +478,7 @@
           <a:p>
             <a:fld id="{C98C20DD-DDF2-4778-AC95-E3D9ED93958D}" type="datetimeFigureOut">
               <a:rPr lang="en-GB" smtClean="0"/>
-              <a:t>08/04/2018</a:t>
+              <a:t>09/04/2018</a:t>
             </a:fld>
             <a:endParaRPr lang="en-GB" dirty="0"/>
           </a:p>
@@ -687,7 +688,7 @@
           <a:p>
             <a:fld id="{C98C20DD-DDF2-4778-AC95-E3D9ED93958D}" type="datetimeFigureOut">
               <a:rPr lang="en-GB" smtClean="0"/>
-              <a:t>08/04/2018</a:t>
+              <a:t>09/04/2018</a:t>
             </a:fld>
             <a:endParaRPr lang="en-GB" dirty="0"/>
           </a:p>
@@ -887,7 +888,7 @@
           <a:p>
             <a:fld id="{C98C20DD-DDF2-4778-AC95-E3D9ED93958D}" type="datetimeFigureOut">
               <a:rPr lang="en-GB" smtClean="0"/>
-              <a:t>08/04/2018</a:t>
+              <a:t>09/04/2018</a:t>
             </a:fld>
             <a:endParaRPr lang="en-GB" dirty="0"/>
           </a:p>
@@ -1163,7 +1164,7 @@
           <a:p>
             <a:fld id="{C98C20DD-DDF2-4778-AC95-E3D9ED93958D}" type="datetimeFigureOut">
               <a:rPr lang="en-GB" smtClean="0"/>
-              <a:t>08/04/2018</a:t>
+              <a:t>09/04/2018</a:t>
             </a:fld>
             <a:endParaRPr lang="en-GB" dirty="0"/>
           </a:p>
@@ -1431,7 +1432,7 @@
           <a:p>
             <a:fld id="{C98C20DD-DDF2-4778-AC95-E3D9ED93958D}" type="datetimeFigureOut">
               <a:rPr lang="en-GB" smtClean="0"/>
-              <a:t>08/04/2018</a:t>
+              <a:t>09/04/2018</a:t>
             </a:fld>
             <a:endParaRPr lang="en-GB" dirty="0"/>
           </a:p>
@@ -1846,7 +1847,7 @@
           <a:p>
             <a:fld id="{C98C20DD-DDF2-4778-AC95-E3D9ED93958D}" type="datetimeFigureOut">
               <a:rPr lang="en-GB" smtClean="0"/>
-              <a:t>08/04/2018</a:t>
+              <a:t>09/04/2018</a:t>
             </a:fld>
             <a:endParaRPr lang="en-GB" dirty="0"/>
           </a:p>
@@ -1988,7 +1989,7 @@
           <a:p>
             <a:fld id="{C98C20DD-DDF2-4778-AC95-E3D9ED93958D}" type="datetimeFigureOut">
               <a:rPr lang="en-GB" smtClean="0"/>
-              <a:t>08/04/2018</a:t>
+              <a:t>09/04/2018</a:t>
             </a:fld>
             <a:endParaRPr lang="en-GB" dirty="0"/>
           </a:p>
@@ -2101,7 +2102,7 @@
           <a:p>
             <a:fld id="{C98C20DD-DDF2-4778-AC95-E3D9ED93958D}" type="datetimeFigureOut">
               <a:rPr lang="en-GB" smtClean="0"/>
-              <a:t>08/04/2018</a:t>
+              <a:t>09/04/2018</a:t>
             </a:fld>
             <a:endParaRPr lang="en-GB" dirty="0"/>
           </a:p>
@@ -2414,7 +2415,7 @@
           <a:p>
             <a:fld id="{C98C20DD-DDF2-4778-AC95-E3D9ED93958D}" type="datetimeFigureOut">
               <a:rPr lang="en-GB" smtClean="0"/>
-              <a:t>08/04/2018</a:t>
+              <a:t>09/04/2018</a:t>
             </a:fld>
             <a:endParaRPr lang="en-GB" dirty="0"/>
           </a:p>
@@ -2703,7 +2704,7 @@
           <a:p>
             <a:fld id="{C98C20DD-DDF2-4778-AC95-E3D9ED93958D}" type="datetimeFigureOut">
               <a:rPr lang="en-GB" smtClean="0"/>
-              <a:t>08/04/2018</a:t>
+              <a:t>09/04/2018</a:t>
             </a:fld>
             <a:endParaRPr lang="en-GB" dirty="0"/>
           </a:p>
@@ -2946,7 +2947,7 @@
           <a:p>
             <a:fld id="{C98C20DD-DDF2-4778-AC95-E3D9ED93958D}" type="datetimeFigureOut">
               <a:rPr lang="en-GB" smtClean="0"/>
-              <a:t>08/04/2018</a:t>
+              <a:t>09/04/2018</a:t>
             </a:fld>
             <a:endParaRPr lang="en-GB" dirty="0"/>
           </a:p>
@@ -8832,18 +8833,15 @@
                 <a:latin typeface="Segoe UI Light" panose="020B0502040204020203" pitchFamily="34" charset="0"/>
                 <a:cs typeface="Segoe UI Light" panose="020B0502040204020203" pitchFamily="34" charset="0"/>
               </a:rPr>
-              <a:t>Methods that behave like instance methods, even though they're </a:t>
-            </a:r>
-            <a:r>
-              <a:rPr lang="en-GB" sz="2400" dirty="0">
-                <a:solidFill>
-                  <a:srgbClr val="00B0F0"/>
-                </a:solidFill>
-                <a:latin typeface="Segoe UI Light" panose="020B0502040204020203" pitchFamily="34" charset="0"/>
-                <a:cs typeface="Segoe UI Light" panose="020B0502040204020203" pitchFamily="34" charset="0"/>
-              </a:rPr>
-              <a:t>static</a:t>
-            </a:r>
+              <a:t>Set of technologies that enable query capabilities to be built directly into the language</a:t>
+            </a:r>
+            <a:endParaRPr lang="en-GB" sz="2400" dirty="0">
+              <a:solidFill>
+                <a:srgbClr val="00B0F0"/>
+              </a:solidFill>
+              <a:latin typeface="Segoe UI Light" panose="020B0502040204020203" pitchFamily="34" charset="0"/>
+              <a:cs typeface="Segoe UI Light" panose="020B0502040204020203" pitchFamily="34" charset="0"/>
+            </a:endParaRPr>
           </a:p>
           <a:p>
             <a:pPr marL="742950" lvl="1" indent="-285750">
@@ -8858,24 +8856,82 @@
                 <a:latin typeface="Segoe UI Light" panose="020B0502040204020203" pitchFamily="34" charset="0"/>
                 <a:cs typeface="Segoe UI Light" panose="020B0502040204020203" pitchFamily="34" charset="0"/>
               </a:rPr>
-              <a:t>Special syntax uses the first method parameter to define the object type the method is bound to using the </a:t>
-            </a:r>
-            <a:r>
-              <a:rPr lang="en-GB" sz="2400" dirty="0">
-                <a:solidFill>
-                  <a:srgbClr val="00B0F0"/>
-                </a:solidFill>
-                <a:latin typeface="Segoe UI Light" panose="020B0502040204020203" pitchFamily="34" charset="0"/>
-                <a:cs typeface="Segoe UI Light" panose="020B0502040204020203" pitchFamily="34" charset="0"/>
-              </a:rPr>
-              <a:t>this</a:t>
-            </a:r>
-            <a:r>
-              <a:rPr lang="en-GB" sz="2400" dirty="0">
-                <a:latin typeface="Segoe UI Light" panose="020B0502040204020203" pitchFamily="34" charset="0"/>
-                <a:cs typeface="Segoe UI Light" panose="020B0502040204020203" pitchFamily="34" charset="0"/>
-              </a:rPr>
-              <a:t> keyword</a:t>
+              <a:t>Spans a broad range of </a:t>
+            </a:r>
+            <a:r>
+              <a:rPr lang="en-GB" sz="2400" dirty="0" err="1">
+                <a:latin typeface="Segoe UI Light" panose="020B0502040204020203" pitchFamily="34" charset="0"/>
+                <a:cs typeface="Segoe UI Light" panose="020B0502040204020203" pitchFamily="34" charset="0"/>
+              </a:rPr>
+              <a:t>queryable</a:t>
+            </a:r>
+            <a:r>
+              <a:rPr lang="en-GB" sz="2400" dirty="0">
+                <a:latin typeface="Segoe UI Light" panose="020B0502040204020203" pitchFamily="34" charset="0"/>
+                <a:cs typeface="Segoe UI Light" panose="020B0502040204020203" pitchFamily="34" charset="0"/>
+              </a:rPr>
+              <a:t> data sources</a:t>
+            </a:r>
+            <a:endParaRPr lang="en-GB" sz="2400" dirty="0">
+              <a:solidFill>
+                <a:srgbClr val="00B0F0"/>
+              </a:solidFill>
+              <a:latin typeface="Segoe UI Light" panose="020B0502040204020203" pitchFamily="34" charset="0"/>
+              <a:cs typeface="Segoe UI Light" panose="020B0502040204020203" pitchFamily="34" charset="0"/>
+            </a:endParaRPr>
+          </a:p>
+          <a:p>
+            <a:pPr marL="1200150" lvl="2" indent="-285750">
+              <a:lnSpc>
+                <a:spcPct val="150000"/>
+              </a:lnSpc>
+              <a:buFont typeface="Wingdings" panose="05000000000000000000" pitchFamily="2" charset="2"/>
+              <a:buChar char="§"/>
+            </a:pPr>
+            <a:r>
+              <a:rPr lang="en-GB" sz="2400" dirty="0">
+                <a:latin typeface="Segoe UI Light" panose="020B0502040204020203" pitchFamily="34" charset="0"/>
+                <a:cs typeface="Segoe UI Light" panose="020B0502040204020203" pitchFamily="34" charset="0"/>
+              </a:rPr>
+              <a:t>LINQ-to-Objects provides the ability to query in-memory objects and collections</a:t>
+            </a:r>
+          </a:p>
+          <a:p>
+            <a:pPr marL="1200150" lvl="2" indent="-285750">
+              <a:lnSpc>
+                <a:spcPct val="150000"/>
+              </a:lnSpc>
+              <a:buFont typeface="Wingdings" panose="05000000000000000000" pitchFamily="2" charset="2"/>
+              <a:buChar char="§"/>
+            </a:pPr>
+            <a:r>
+              <a:rPr lang="en-GB" sz="2400" dirty="0">
+                <a:solidFill>
+                  <a:schemeClr val="bg1"/>
+                </a:solidFill>
+                <a:latin typeface="Segoe UI Light" panose="020B0502040204020203" pitchFamily="34" charset="0"/>
+                <a:cs typeface="Segoe UI Light" panose="020B0502040204020203" pitchFamily="34" charset="0"/>
+              </a:rPr>
+              <a:t>LINQ-to-SQL converts LINQ query expressions to SQL queries. This technology has since been superseded by Entity Framework, however LINQ-To-SQL still provides a lot of the capability underpinning Entity Framework</a:t>
+            </a:r>
+          </a:p>
+          <a:p>
+            <a:pPr marL="1200150" lvl="2" indent="-285750">
+              <a:lnSpc>
+                <a:spcPct val="150000"/>
+              </a:lnSpc>
+              <a:buFont typeface="Wingdings" panose="05000000000000000000" pitchFamily="2" charset="2"/>
+              <a:buChar char="§"/>
+            </a:pPr>
+            <a:r>
+              <a:rPr lang="en-GB" sz="2400" dirty="0">
+                <a:solidFill>
+                  <a:schemeClr val="bg1"/>
+                </a:solidFill>
+                <a:latin typeface="Segoe UI Light" panose="020B0502040204020203" pitchFamily="34" charset="0"/>
+                <a:cs typeface="Segoe UI Light" panose="020B0502040204020203" pitchFamily="34" charset="0"/>
+              </a:rPr>
+              <a:t>LINQ-to-XML provides the ability to traverse the XML DOM using LINQ query expressions</a:t>
             </a:r>
           </a:p>
           <a:p>
@@ -8888,733 +8944,14 @@
             </a:pPr>
             <a:r>
               <a:rPr lang="en-GB" sz="2400" dirty="0">
-                <a:latin typeface="Segoe UI Light" panose="020B0502040204020203" pitchFamily="34" charset="0"/>
-                <a:cs typeface="Segoe UI Light" panose="020B0502040204020203" pitchFamily="34" charset="0"/>
-              </a:rPr>
-              <a:t>Must be defined in a </a:t>
-            </a:r>
-            <a:r>
-              <a:rPr lang="en-GB" sz="2400" dirty="0">
-                <a:solidFill>
-                  <a:srgbClr val="00B0F0"/>
-                </a:solidFill>
-                <a:latin typeface="Segoe UI Light" panose="020B0502040204020203" pitchFamily="34" charset="0"/>
-                <a:cs typeface="Segoe UI Light" panose="020B0502040204020203" pitchFamily="34" charset="0"/>
-              </a:rPr>
-              <a:t>static</a:t>
-            </a:r>
-            <a:r>
-              <a:rPr lang="en-GB" sz="2400" dirty="0">
-                <a:latin typeface="Segoe UI Light" panose="020B0502040204020203" pitchFamily="34" charset="0"/>
-                <a:cs typeface="Segoe UI Light" panose="020B0502040204020203" pitchFamily="34" charset="0"/>
-              </a:rPr>
-              <a:t> </a:t>
-            </a:r>
-            <a:r>
-              <a:rPr lang="en-GB" sz="2400" dirty="0">
-                <a:solidFill>
-                  <a:srgbClr val="00B0F0"/>
-                </a:solidFill>
-                <a:latin typeface="Segoe UI Light" panose="020B0502040204020203" pitchFamily="34" charset="0"/>
-                <a:cs typeface="Segoe UI Light" panose="020B0502040204020203" pitchFamily="34" charset="0"/>
-              </a:rPr>
-              <a:t>class</a:t>
-            </a:r>
-          </a:p>
-          <a:p>
-            <a:pPr lvl="1">
-              <a:lnSpc>
-                <a:spcPct val="150000"/>
-              </a:lnSpc>
-            </a:pPr>
-            <a:endParaRPr lang="en-GB" sz="2400" dirty="0">
-              <a:latin typeface="Segoe UI Light" panose="020B0502040204020203" pitchFamily="34" charset="0"/>
-              <a:cs typeface="Segoe UI Light" panose="020B0502040204020203" pitchFamily="34" charset="0"/>
-            </a:endParaRPr>
-          </a:p>
-          <a:p>
-            <a:pPr lvl="1"/>
-            <a:r>
-              <a:rPr lang="en-GB" sz="1600" dirty="0">
-                <a:solidFill>
-                  <a:srgbClr val="00B0F0"/>
-                </a:solidFill>
-                <a:latin typeface="Consolas" panose="020B0609020204030204" pitchFamily="49" charset="0"/>
-                <a:cs typeface="Segoe UI Light" panose="020B0502040204020203" pitchFamily="34" charset="0"/>
-              </a:rPr>
-              <a:t>public</a:t>
-            </a:r>
-            <a:r>
-              <a:rPr lang="en-GB" sz="1600" dirty="0">
-                <a:solidFill>
-                  <a:schemeClr val="bg1">
-                    <a:lumMod val="85000"/>
-                  </a:schemeClr>
-                </a:solidFill>
-                <a:latin typeface="Consolas" panose="020B0609020204030204" pitchFamily="49" charset="0"/>
-                <a:cs typeface="Segoe UI Light" panose="020B0502040204020203" pitchFamily="34" charset="0"/>
-              </a:rPr>
-              <a:t> </a:t>
-            </a:r>
-            <a:r>
-              <a:rPr lang="en-GB" sz="1600" dirty="0">
-                <a:solidFill>
-                  <a:srgbClr val="00B0F0"/>
-                </a:solidFill>
-                <a:latin typeface="Consolas" panose="020B0609020204030204" pitchFamily="49" charset="0"/>
-                <a:cs typeface="Segoe UI Light" panose="020B0502040204020203" pitchFamily="34" charset="0"/>
-              </a:rPr>
-              <a:t>static</a:t>
-            </a:r>
-            <a:r>
-              <a:rPr lang="en-GB" sz="1600" dirty="0">
-                <a:solidFill>
-                  <a:schemeClr val="bg1">
-                    <a:lumMod val="85000"/>
-                  </a:schemeClr>
-                </a:solidFill>
-                <a:latin typeface="Consolas" panose="020B0609020204030204" pitchFamily="49" charset="0"/>
-                <a:cs typeface="Segoe UI Light" panose="020B0502040204020203" pitchFamily="34" charset="0"/>
-              </a:rPr>
-              <a:t> </a:t>
-            </a:r>
-            <a:r>
-              <a:rPr lang="en-GB" sz="1600" dirty="0">
-                <a:solidFill>
-                  <a:srgbClr val="00B0F0"/>
-                </a:solidFill>
-                <a:latin typeface="Consolas" panose="020B0609020204030204" pitchFamily="49" charset="0"/>
-                <a:cs typeface="Segoe UI Light" panose="020B0502040204020203" pitchFamily="34" charset="0"/>
-              </a:rPr>
-              <a:t>class</a:t>
-            </a:r>
-            <a:r>
-              <a:rPr lang="en-GB" sz="1600" dirty="0">
-                <a:solidFill>
-                  <a:schemeClr val="bg1">
-                    <a:lumMod val="85000"/>
-                  </a:schemeClr>
-                </a:solidFill>
-                <a:latin typeface="Consolas" panose="020B0609020204030204" pitchFamily="49" charset="0"/>
-                <a:cs typeface="Segoe UI Light" panose="020B0502040204020203" pitchFamily="34" charset="0"/>
-              </a:rPr>
-              <a:t> </a:t>
-            </a:r>
-            <a:r>
-              <a:rPr lang="en-GB" sz="1600" dirty="0" err="1">
-                <a:solidFill>
-                  <a:srgbClr val="00CC99"/>
-                </a:solidFill>
-                <a:latin typeface="Consolas" panose="020B0609020204030204" pitchFamily="49" charset="0"/>
-                <a:cs typeface="Segoe UI Light" panose="020B0502040204020203" pitchFamily="34" charset="0"/>
-              </a:rPr>
-              <a:t>StringExtensions</a:t>
-            </a:r>
-            <a:endParaRPr lang="en-GB" sz="1600" dirty="0">
-              <a:solidFill>
-                <a:srgbClr val="00CC99"/>
-              </a:solidFill>
-              <a:latin typeface="Consolas" panose="020B0609020204030204" pitchFamily="49" charset="0"/>
-              <a:cs typeface="Segoe UI Light" panose="020B0502040204020203" pitchFamily="34" charset="0"/>
-            </a:endParaRPr>
-          </a:p>
-          <a:p>
-            <a:pPr lvl="1"/>
-            <a:r>
-              <a:rPr lang="en-GB" sz="1600" dirty="0">
-                <a:solidFill>
-                  <a:schemeClr val="bg1">
-                    <a:lumMod val="85000"/>
-                  </a:schemeClr>
-                </a:solidFill>
-                <a:latin typeface="Consolas" panose="020B0609020204030204" pitchFamily="49" charset="0"/>
-                <a:cs typeface="Segoe UI Light" panose="020B0502040204020203" pitchFamily="34" charset="0"/>
-              </a:rPr>
-              <a:t>{</a:t>
-            </a:r>
-          </a:p>
-          <a:p>
-            <a:pPr lvl="1"/>
-            <a:r>
-              <a:rPr lang="en-GB" sz="1600" dirty="0">
-                <a:solidFill>
-                  <a:schemeClr val="bg1">
-                    <a:lumMod val="85000"/>
-                  </a:schemeClr>
-                </a:solidFill>
-                <a:latin typeface="Consolas" panose="020B0609020204030204" pitchFamily="49" charset="0"/>
-                <a:cs typeface="Segoe UI Light" panose="020B0502040204020203" pitchFamily="34" charset="0"/>
-              </a:rPr>
-              <a:t>    </a:t>
-            </a:r>
-            <a:r>
-              <a:rPr lang="en-GB" sz="1600" dirty="0">
-                <a:solidFill>
-                  <a:srgbClr val="00B0F0"/>
-                </a:solidFill>
-                <a:latin typeface="Consolas" panose="020B0609020204030204" pitchFamily="49" charset="0"/>
-                <a:cs typeface="Segoe UI Light" panose="020B0502040204020203" pitchFamily="34" charset="0"/>
-              </a:rPr>
-              <a:t>public</a:t>
-            </a:r>
-            <a:r>
-              <a:rPr lang="en-GB" sz="1600" dirty="0">
-                <a:solidFill>
-                  <a:schemeClr val="bg1">
-                    <a:lumMod val="85000"/>
-                  </a:schemeClr>
-                </a:solidFill>
-                <a:latin typeface="Consolas" panose="020B0609020204030204" pitchFamily="49" charset="0"/>
-                <a:cs typeface="Segoe UI Light" panose="020B0502040204020203" pitchFamily="34" charset="0"/>
-              </a:rPr>
-              <a:t> </a:t>
-            </a:r>
-            <a:r>
-              <a:rPr lang="en-GB" sz="1600" dirty="0">
-                <a:solidFill>
-                  <a:srgbClr val="00B0F0"/>
-                </a:solidFill>
-                <a:latin typeface="Consolas" panose="020B0609020204030204" pitchFamily="49" charset="0"/>
-                <a:cs typeface="Segoe UI Light" panose="020B0502040204020203" pitchFamily="34" charset="0"/>
-              </a:rPr>
-              <a:t>static</a:t>
-            </a:r>
-            <a:r>
-              <a:rPr lang="en-GB" sz="1600" dirty="0">
-                <a:solidFill>
-                  <a:schemeClr val="bg1">
-                    <a:lumMod val="85000"/>
-                  </a:schemeClr>
-                </a:solidFill>
-                <a:latin typeface="Consolas" panose="020B0609020204030204" pitchFamily="49" charset="0"/>
-                <a:cs typeface="Segoe UI Light" panose="020B0502040204020203" pitchFamily="34" charset="0"/>
-              </a:rPr>
-              <a:t> </a:t>
-            </a:r>
-            <a:r>
-              <a:rPr lang="en-GB" sz="1600" dirty="0">
-                <a:solidFill>
-                  <a:srgbClr val="00B0F0"/>
-                </a:solidFill>
-                <a:latin typeface="Consolas" panose="020B0609020204030204" pitchFamily="49" charset="0"/>
-                <a:cs typeface="Segoe UI Light" panose="020B0502040204020203" pitchFamily="34" charset="0"/>
-              </a:rPr>
-              <a:t>bool</a:t>
-            </a:r>
-            <a:r>
-              <a:rPr lang="en-GB" sz="1600" dirty="0">
-                <a:solidFill>
-                  <a:schemeClr val="bg1">
-                    <a:lumMod val="85000"/>
-                  </a:schemeClr>
-                </a:solidFill>
-                <a:latin typeface="Consolas" panose="020B0609020204030204" pitchFamily="49" charset="0"/>
-                <a:cs typeface="Segoe UI Light" panose="020B0502040204020203" pitchFamily="34" charset="0"/>
-              </a:rPr>
-              <a:t> </a:t>
-            </a:r>
-            <a:r>
-              <a:rPr lang="en-GB" sz="1600" dirty="0" err="1">
-                <a:solidFill>
-                  <a:schemeClr val="bg1">
-                    <a:lumMod val="85000"/>
-                  </a:schemeClr>
-                </a:solidFill>
-                <a:latin typeface="Consolas" panose="020B0609020204030204" pitchFamily="49" charset="0"/>
-                <a:cs typeface="Segoe UI Light" panose="020B0502040204020203" pitchFamily="34" charset="0"/>
-              </a:rPr>
-              <a:t>IsPalindrome</a:t>
-            </a:r>
-            <a:r>
-              <a:rPr lang="en-GB" sz="1600" dirty="0">
-                <a:solidFill>
-                  <a:schemeClr val="bg1">
-                    <a:lumMod val="85000"/>
-                  </a:schemeClr>
-                </a:solidFill>
-                <a:latin typeface="Consolas" panose="020B0609020204030204" pitchFamily="49" charset="0"/>
-                <a:cs typeface="Segoe UI Light" panose="020B0502040204020203" pitchFamily="34" charset="0"/>
-              </a:rPr>
-              <a:t>(</a:t>
-            </a:r>
-            <a:r>
-              <a:rPr lang="en-GB" sz="1600" dirty="0">
-                <a:solidFill>
-                  <a:srgbClr val="00B0F0"/>
-                </a:solidFill>
-                <a:latin typeface="Consolas" panose="020B0609020204030204" pitchFamily="49" charset="0"/>
-                <a:cs typeface="Segoe UI Light" panose="020B0502040204020203" pitchFamily="34" charset="0"/>
-              </a:rPr>
-              <a:t>this</a:t>
-            </a:r>
-            <a:r>
-              <a:rPr lang="en-GB" sz="1600" dirty="0">
-                <a:solidFill>
-                  <a:schemeClr val="bg1">
-                    <a:lumMod val="85000"/>
-                  </a:schemeClr>
-                </a:solidFill>
-                <a:latin typeface="Consolas" panose="020B0609020204030204" pitchFamily="49" charset="0"/>
-                <a:cs typeface="Segoe UI Light" panose="020B0502040204020203" pitchFamily="34" charset="0"/>
-              </a:rPr>
-              <a:t> </a:t>
-            </a:r>
-            <a:r>
-              <a:rPr lang="en-GB" sz="1600" dirty="0">
-                <a:solidFill>
-                  <a:srgbClr val="00B0F0"/>
-                </a:solidFill>
-                <a:latin typeface="Consolas" panose="020B0609020204030204" pitchFamily="49" charset="0"/>
-                <a:cs typeface="Segoe UI Light" panose="020B0502040204020203" pitchFamily="34" charset="0"/>
-              </a:rPr>
-              <a:t>string</a:t>
-            </a:r>
-            <a:r>
-              <a:rPr lang="en-GB" sz="1600" dirty="0">
-                <a:solidFill>
-                  <a:schemeClr val="bg1">
-                    <a:lumMod val="85000"/>
-                  </a:schemeClr>
-                </a:solidFill>
-                <a:latin typeface="Consolas" panose="020B0609020204030204" pitchFamily="49" charset="0"/>
-                <a:cs typeface="Segoe UI Light" panose="020B0502040204020203" pitchFamily="34" charset="0"/>
-              </a:rPr>
-              <a:t> value) { … }</a:t>
-            </a:r>
-          </a:p>
-          <a:p>
-            <a:pPr lvl="1"/>
-            <a:endParaRPr lang="en-GB" sz="1600" dirty="0">
-              <a:solidFill>
-                <a:schemeClr val="bg1">
-                  <a:lumMod val="85000"/>
-                </a:schemeClr>
-              </a:solidFill>
-              <a:latin typeface="Consolas" panose="020B0609020204030204" pitchFamily="49" charset="0"/>
-              <a:cs typeface="Segoe UI Light" panose="020B0502040204020203" pitchFamily="34" charset="0"/>
-            </a:endParaRPr>
-          </a:p>
-          <a:p>
-            <a:pPr lvl="1"/>
-            <a:r>
-              <a:rPr lang="en-GB" sz="1600" dirty="0">
-                <a:solidFill>
-                  <a:schemeClr val="bg1">
-                    <a:lumMod val="85000"/>
-                  </a:schemeClr>
-                </a:solidFill>
-                <a:latin typeface="Consolas" panose="020B0609020204030204" pitchFamily="49" charset="0"/>
-                <a:cs typeface="Segoe UI Light" panose="020B0502040204020203" pitchFamily="34" charset="0"/>
-              </a:rPr>
-              <a:t>    </a:t>
-            </a:r>
-            <a:r>
-              <a:rPr lang="en-GB" sz="1600" dirty="0">
-                <a:solidFill>
-                  <a:srgbClr val="00B0F0"/>
-                </a:solidFill>
-                <a:latin typeface="Consolas" panose="020B0609020204030204" pitchFamily="49" charset="0"/>
-                <a:cs typeface="Segoe UI Light" panose="020B0502040204020203" pitchFamily="34" charset="0"/>
-              </a:rPr>
-              <a:t>public</a:t>
-            </a:r>
-            <a:r>
-              <a:rPr lang="en-GB" sz="1600" dirty="0">
-                <a:solidFill>
-                  <a:schemeClr val="bg1">
-                    <a:lumMod val="85000"/>
-                  </a:schemeClr>
-                </a:solidFill>
-                <a:latin typeface="Consolas" panose="020B0609020204030204" pitchFamily="49" charset="0"/>
-                <a:cs typeface="Segoe UI Light" panose="020B0502040204020203" pitchFamily="34" charset="0"/>
-              </a:rPr>
-              <a:t> </a:t>
-            </a:r>
-            <a:r>
-              <a:rPr lang="en-GB" sz="1600" dirty="0">
-                <a:solidFill>
-                  <a:srgbClr val="00B0F0"/>
-                </a:solidFill>
-                <a:latin typeface="Consolas" panose="020B0609020204030204" pitchFamily="49" charset="0"/>
-                <a:cs typeface="Segoe UI Light" panose="020B0502040204020203" pitchFamily="34" charset="0"/>
-              </a:rPr>
-              <a:t>static</a:t>
-            </a:r>
-            <a:r>
-              <a:rPr lang="en-GB" sz="1600" dirty="0">
-                <a:solidFill>
-                  <a:schemeClr val="bg1">
-                    <a:lumMod val="85000"/>
-                  </a:schemeClr>
-                </a:solidFill>
-                <a:latin typeface="Consolas" panose="020B0609020204030204" pitchFamily="49" charset="0"/>
-                <a:cs typeface="Segoe UI Light" panose="020B0502040204020203" pitchFamily="34" charset="0"/>
-              </a:rPr>
-              <a:t> </a:t>
-            </a:r>
-            <a:r>
-              <a:rPr lang="en-GB" sz="1600" dirty="0">
-                <a:solidFill>
-                  <a:srgbClr val="00B0F0"/>
-                </a:solidFill>
-                <a:latin typeface="Consolas" panose="020B0609020204030204" pitchFamily="49" charset="0"/>
-                <a:cs typeface="Segoe UI Light" panose="020B0502040204020203" pitchFamily="34" charset="0"/>
-              </a:rPr>
-              <a:t>byte</a:t>
-            </a:r>
-            <a:r>
-              <a:rPr lang="en-GB" sz="1600" dirty="0">
-                <a:solidFill>
-                  <a:schemeClr val="bg1">
-                    <a:lumMod val="85000"/>
-                  </a:schemeClr>
-                </a:solidFill>
-                <a:latin typeface="Consolas" panose="020B0609020204030204" pitchFamily="49" charset="0"/>
-                <a:cs typeface="Segoe UI Light" panose="020B0502040204020203" pitchFamily="34" charset="0"/>
-              </a:rPr>
-              <a:t>[] </a:t>
-            </a:r>
-            <a:r>
-              <a:rPr lang="en-GB" sz="1600" dirty="0" err="1">
-                <a:solidFill>
-                  <a:schemeClr val="bg1">
-                    <a:lumMod val="85000"/>
-                  </a:schemeClr>
-                </a:solidFill>
-                <a:latin typeface="Consolas" panose="020B0609020204030204" pitchFamily="49" charset="0"/>
-                <a:cs typeface="Segoe UI Light" panose="020B0502040204020203" pitchFamily="34" charset="0"/>
-              </a:rPr>
-              <a:t>ToByteArray</a:t>
-            </a:r>
-            <a:r>
-              <a:rPr lang="en-GB" sz="1600" dirty="0">
-                <a:solidFill>
-                  <a:schemeClr val="bg1">
-                    <a:lumMod val="85000"/>
-                  </a:schemeClr>
-                </a:solidFill>
-                <a:latin typeface="Consolas" panose="020B0609020204030204" pitchFamily="49" charset="0"/>
-                <a:cs typeface="Segoe UI Light" panose="020B0502040204020203" pitchFamily="34" charset="0"/>
-              </a:rPr>
-              <a:t>(</a:t>
-            </a:r>
-            <a:r>
-              <a:rPr lang="en-GB" sz="1600" dirty="0">
-                <a:solidFill>
-                  <a:srgbClr val="00B0F0"/>
-                </a:solidFill>
-                <a:latin typeface="Consolas" panose="020B0609020204030204" pitchFamily="49" charset="0"/>
-                <a:cs typeface="Segoe UI Light" panose="020B0502040204020203" pitchFamily="34" charset="0"/>
-              </a:rPr>
-              <a:t>this</a:t>
-            </a:r>
-            <a:r>
-              <a:rPr lang="en-GB" sz="1600" dirty="0">
-                <a:solidFill>
-                  <a:schemeClr val="bg1">
-                    <a:lumMod val="85000"/>
-                  </a:schemeClr>
-                </a:solidFill>
-                <a:latin typeface="Consolas" panose="020B0609020204030204" pitchFamily="49" charset="0"/>
-                <a:cs typeface="Segoe UI Light" panose="020B0502040204020203" pitchFamily="34" charset="0"/>
-              </a:rPr>
-              <a:t> </a:t>
-            </a:r>
-            <a:r>
-              <a:rPr lang="en-GB" sz="1600" dirty="0">
-                <a:solidFill>
-                  <a:srgbClr val="00B0F0"/>
-                </a:solidFill>
-                <a:latin typeface="Consolas" panose="020B0609020204030204" pitchFamily="49" charset="0"/>
-                <a:cs typeface="Segoe UI Light" panose="020B0502040204020203" pitchFamily="34" charset="0"/>
-              </a:rPr>
-              <a:t>string</a:t>
-            </a:r>
-            <a:r>
-              <a:rPr lang="en-GB" sz="1600" dirty="0">
-                <a:solidFill>
-                  <a:schemeClr val="bg1">
-                    <a:lumMod val="85000"/>
-                  </a:schemeClr>
-                </a:solidFill>
-                <a:latin typeface="Consolas" panose="020B0609020204030204" pitchFamily="49" charset="0"/>
-                <a:cs typeface="Segoe UI Light" panose="020B0502040204020203" pitchFamily="34" charset="0"/>
-              </a:rPr>
-              <a:t> value, </a:t>
-            </a:r>
-            <a:r>
-              <a:rPr lang="en-GB" sz="1600" dirty="0">
-                <a:solidFill>
-                  <a:srgbClr val="00CC99"/>
-                </a:solidFill>
-                <a:latin typeface="Consolas" panose="020B0609020204030204" pitchFamily="49" charset="0"/>
-                <a:cs typeface="Segoe UI Light" panose="020B0502040204020203" pitchFamily="34" charset="0"/>
-              </a:rPr>
-              <a:t>Encoding</a:t>
-            </a:r>
-            <a:r>
-              <a:rPr lang="en-GB" sz="1600" dirty="0">
-                <a:solidFill>
-                  <a:schemeClr val="bg1">
-                    <a:lumMod val="85000"/>
-                  </a:schemeClr>
-                </a:solidFill>
-                <a:latin typeface="Consolas" panose="020B0609020204030204" pitchFamily="49" charset="0"/>
-                <a:cs typeface="Segoe UI Light" panose="020B0502040204020203" pitchFamily="34" charset="0"/>
-              </a:rPr>
-              <a:t> encoding) { … }</a:t>
-            </a:r>
-          </a:p>
-          <a:p>
-            <a:pPr lvl="1"/>
-            <a:r>
-              <a:rPr lang="en-GB" sz="1600" dirty="0">
-                <a:solidFill>
-                  <a:schemeClr val="bg1">
-                    <a:lumMod val="85000"/>
-                  </a:schemeClr>
-                </a:solidFill>
-                <a:latin typeface="Consolas" panose="020B0609020204030204" pitchFamily="49" charset="0"/>
-                <a:cs typeface="Segoe UI Light" panose="020B0502040204020203" pitchFamily="34" charset="0"/>
-              </a:rPr>
-              <a:t>}</a:t>
-            </a:r>
-          </a:p>
-          <a:p>
-            <a:pPr lvl="1"/>
-            <a:endParaRPr lang="en-GB" sz="1600" dirty="0">
-              <a:solidFill>
-                <a:schemeClr val="bg1">
-                  <a:lumMod val="85000"/>
-                </a:schemeClr>
-              </a:solidFill>
-              <a:latin typeface="Consolas" panose="020B0609020204030204" pitchFamily="49" charset="0"/>
-              <a:cs typeface="Segoe UI Light" panose="020B0502040204020203" pitchFamily="34" charset="0"/>
-            </a:endParaRPr>
-          </a:p>
-          <a:p>
-            <a:pPr lvl="1"/>
-            <a:r>
-              <a:rPr lang="en-GB" sz="1600" dirty="0">
-                <a:solidFill>
-                  <a:srgbClr val="00B0F0"/>
-                </a:solidFill>
-                <a:latin typeface="Consolas" panose="020B0609020204030204" pitchFamily="49" charset="0"/>
-                <a:cs typeface="Segoe UI Light" panose="020B0502040204020203" pitchFamily="34" charset="0"/>
-              </a:rPr>
-              <a:t>string</a:t>
-            </a:r>
-            <a:r>
-              <a:rPr lang="en-GB" sz="1600" dirty="0">
-                <a:solidFill>
-                  <a:schemeClr val="bg1">
-                    <a:lumMod val="85000"/>
-                  </a:schemeClr>
-                </a:solidFill>
-                <a:latin typeface="Consolas" panose="020B0609020204030204" pitchFamily="49" charset="0"/>
-                <a:cs typeface="Segoe UI Light" panose="020B0502040204020203" pitchFamily="34" charset="0"/>
-              </a:rPr>
-              <a:t> word = </a:t>
-            </a:r>
-            <a:r>
-              <a:rPr lang="en-GB" sz="1600" dirty="0">
-                <a:solidFill>
-                  <a:srgbClr val="C00000"/>
-                </a:solidFill>
-                <a:latin typeface="Consolas" panose="020B0609020204030204" pitchFamily="49" charset="0"/>
-                <a:cs typeface="Segoe UI Light" panose="020B0502040204020203" pitchFamily="34" charset="0"/>
-              </a:rPr>
-              <a:t>"level"</a:t>
-            </a:r>
-            <a:r>
-              <a:rPr lang="en-GB" sz="1600" dirty="0">
-                <a:solidFill>
-                  <a:schemeClr val="bg1">
-                    <a:lumMod val="85000"/>
-                  </a:schemeClr>
-                </a:solidFill>
-                <a:latin typeface="Consolas" panose="020B0609020204030204" pitchFamily="49" charset="0"/>
-                <a:cs typeface="Segoe UI Light" panose="020B0502040204020203" pitchFamily="34" charset="0"/>
-              </a:rPr>
-              <a:t>;</a:t>
-            </a:r>
-          </a:p>
-          <a:p>
-            <a:pPr lvl="1"/>
-            <a:r>
-              <a:rPr lang="en-GB" sz="1600" dirty="0">
-                <a:solidFill>
-                  <a:srgbClr val="00B0F0"/>
-                </a:solidFill>
-                <a:latin typeface="Consolas" panose="020B0609020204030204" pitchFamily="49" charset="0"/>
-                <a:cs typeface="Segoe UI Light" panose="020B0502040204020203" pitchFamily="34" charset="0"/>
-              </a:rPr>
-              <a:t>bool</a:t>
-            </a:r>
-            <a:r>
-              <a:rPr lang="en-GB" sz="1600" dirty="0">
-                <a:solidFill>
-                  <a:schemeClr val="bg1">
-                    <a:lumMod val="85000"/>
-                  </a:schemeClr>
-                </a:solidFill>
-                <a:latin typeface="Consolas" panose="020B0609020204030204" pitchFamily="49" charset="0"/>
-                <a:cs typeface="Segoe UI Light" panose="020B0502040204020203" pitchFamily="34" charset="0"/>
-              </a:rPr>
-              <a:t> </a:t>
-            </a:r>
-            <a:r>
-              <a:rPr lang="en-GB" sz="1600" dirty="0" err="1">
-                <a:solidFill>
-                  <a:schemeClr val="bg1">
-                    <a:lumMod val="85000"/>
-                  </a:schemeClr>
-                </a:solidFill>
-                <a:latin typeface="Consolas" panose="020B0609020204030204" pitchFamily="49" charset="0"/>
-                <a:cs typeface="Segoe UI Light" panose="020B0502040204020203" pitchFamily="34" charset="0"/>
-              </a:rPr>
-              <a:t>palindromeResult</a:t>
-            </a:r>
-            <a:r>
-              <a:rPr lang="en-GB" sz="1600" dirty="0">
-                <a:solidFill>
-                  <a:schemeClr val="bg1">
-                    <a:lumMod val="85000"/>
-                  </a:schemeClr>
-                </a:solidFill>
-                <a:latin typeface="Consolas" panose="020B0609020204030204" pitchFamily="49" charset="0"/>
-                <a:cs typeface="Segoe UI Light" panose="020B0502040204020203" pitchFamily="34" charset="0"/>
-              </a:rPr>
-              <a:t> = </a:t>
-            </a:r>
-            <a:r>
-              <a:rPr lang="en-GB" sz="1600" dirty="0" err="1">
-                <a:solidFill>
-                  <a:schemeClr val="bg1">
-                    <a:lumMod val="85000"/>
-                  </a:schemeClr>
-                </a:solidFill>
-                <a:latin typeface="Consolas" panose="020B0609020204030204" pitchFamily="49" charset="0"/>
-                <a:cs typeface="Segoe UI Light" panose="020B0502040204020203" pitchFamily="34" charset="0"/>
-              </a:rPr>
-              <a:t>word.IsPalindrome</a:t>
-            </a:r>
-            <a:r>
-              <a:rPr lang="en-GB" sz="1600" dirty="0">
-                <a:solidFill>
-                  <a:schemeClr val="bg1">
-                    <a:lumMod val="85000"/>
-                  </a:schemeClr>
-                </a:solidFill>
-                <a:latin typeface="Consolas" panose="020B0609020204030204" pitchFamily="49" charset="0"/>
-                <a:cs typeface="Segoe UI Light" panose="020B0502040204020203" pitchFamily="34" charset="0"/>
-              </a:rPr>
-              <a:t>();</a:t>
-            </a:r>
-          </a:p>
-          <a:p>
-            <a:pPr lvl="1"/>
-            <a:r>
-              <a:rPr lang="en-GB" sz="1600" dirty="0">
-                <a:solidFill>
-                  <a:srgbClr val="00B0F0"/>
-                </a:solidFill>
-                <a:latin typeface="Consolas" panose="020B0609020204030204" pitchFamily="49" charset="0"/>
-                <a:cs typeface="Segoe UI Light" panose="020B0502040204020203" pitchFamily="34" charset="0"/>
-              </a:rPr>
-              <a:t>byte</a:t>
-            </a:r>
-            <a:r>
-              <a:rPr lang="en-GB" sz="1600" dirty="0">
-                <a:solidFill>
-                  <a:schemeClr val="bg1">
-                    <a:lumMod val="85000"/>
-                  </a:schemeClr>
-                </a:solidFill>
-                <a:latin typeface="Consolas" panose="020B0609020204030204" pitchFamily="49" charset="0"/>
-                <a:cs typeface="Segoe UI Light" panose="020B0502040204020203" pitchFamily="34" charset="0"/>
-              </a:rPr>
-              <a:t>[] </a:t>
-            </a:r>
-            <a:r>
-              <a:rPr lang="en-GB" sz="1600" dirty="0" err="1">
-                <a:solidFill>
-                  <a:schemeClr val="bg1">
-                    <a:lumMod val="85000"/>
-                  </a:schemeClr>
-                </a:solidFill>
-                <a:latin typeface="Consolas" panose="020B0609020204030204" pitchFamily="49" charset="0"/>
-                <a:cs typeface="Segoe UI Light" panose="020B0502040204020203" pitchFamily="34" charset="0"/>
-              </a:rPr>
-              <a:t>wordBytes</a:t>
-            </a:r>
-            <a:r>
-              <a:rPr lang="en-GB" sz="1600" dirty="0">
-                <a:solidFill>
-                  <a:schemeClr val="bg1">
-                    <a:lumMod val="85000"/>
-                  </a:schemeClr>
-                </a:solidFill>
-                <a:latin typeface="Consolas" panose="020B0609020204030204" pitchFamily="49" charset="0"/>
-                <a:cs typeface="Segoe UI Light" panose="020B0502040204020203" pitchFamily="34" charset="0"/>
-              </a:rPr>
-              <a:t> = </a:t>
-            </a:r>
-            <a:r>
-              <a:rPr lang="en-GB" sz="1600" dirty="0" err="1">
-                <a:solidFill>
-                  <a:schemeClr val="bg1">
-                    <a:lumMod val="85000"/>
-                  </a:schemeClr>
-                </a:solidFill>
-                <a:latin typeface="Consolas" panose="020B0609020204030204" pitchFamily="49" charset="0"/>
-                <a:cs typeface="Segoe UI Light" panose="020B0502040204020203" pitchFamily="34" charset="0"/>
-              </a:rPr>
-              <a:t>word.ToByteArray</a:t>
-            </a:r>
-            <a:r>
-              <a:rPr lang="en-GB" sz="1600" dirty="0">
-                <a:solidFill>
-                  <a:schemeClr val="bg1">
-                    <a:lumMod val="85000"/>
-                  </a:schemeClr>
-                </a:solidFill>
-                <a:latin typeface="Consolas" panose="020B0609020204030204" pitchFamily="49" charset="0"/>
-                <a:cs typeface="Segoe UI Light" panose="020B0502040204020203" pitchFamily="34" charset="0"/>
-              </a:rPr>
-              <a:t>(</a:t>
-            </a:r>
-            <a:r>
-              <a:rPr lang="en-GB" sz="1600" dirty="0">
-                <a:solidFill>
-                  <a:srgbClr val="00CC99"/>
-                </a:solidFill>
-                <a:latin typeface="Consolas" panose="020B0609020204030204" pitchFamily="49" charset="0"/>
-                <a:cs typeface="Segoe UI Light" panose="020B0502040204020203" pitchFamily="34" charset="0"/>
-              </a:rPr>
-              <a:t>Encoding</a:t>
-            </a:r>
-            <a:r>
-              <a:rPr lang="en-GB" sz="1600" dirty="0">
-                <a:solidFill>
-                  <a:schemeClr val="bg1">
-                    <a:lumMod val="85000"/>
-                  </a:schemeClr>
-                </a:solidFill>
-                <a:latin typeface="Consolas" panose="020B0609020204030204" pitchFamily="49" charset="0"/>
-                <a:cs typeface="Segoe UI Light" panose="020B0502040204020203" pitchFamily="34" charset="0"/>
-              </a:rPr>
-              <a:t>.UTF8);</a:t>
-            </a:r>
-            <a:endParaRPr lang="en-GB" sz="1600" dirty="0">
-              <a:solidFill>
-                <a:schemeClr val="bg1">
-                  <a:lumMod val="85000"/>
-                </a:schemeClr>
-              </a:solidFill>
-              <a:latin typeface="Segoe UI Light" panose="020B0502040204020203" pitchFamily="34" charset="0"/>
-              <a:cs typeface="Segoe UI Light" panose="020B0502040204020203" pitchFamily="34" charset="0"/>
-            </a:endParaRPr>
+                <a:solidFill>
+                  <a:schemeClr val="bg1"/>
+                </a:solidFill>
+                <a:latin typeface="Segoe UI Light" panose="020B0502040204020203" pitchFamily="34" charset="0"/>
+                <a:cs typeface="Segoe UI Light" panose="020B0502040204020203" pitchFamily="34" charset="0"/>
+              </a:rPr>
+              <a:t>There are two ways to consume LINQ from C# - Query Syntax and Method Syntax</a:t>
+            </a:r>
           </a:p>
         </p:txBody>
       </p:sp>
@@ -9715,7 +9052,7 @@
                 <a:latin typeface="Segoe UI Light" panose="020B0502040204020203" pitchFamily="34" charset="0"/>
                 <a:cs typeface="Segoe UI Light" panose="020B0502040204020203" pitchFamily="34" charset="0"/>
               </a:rPr>
-              <a:t>Keywords</a:t>
+              <a:t>Extension Methods</a:t>
             </a:r>
           </a:p>
         </p:txBody>
@@ -9819,6 +9156,1252 @@
             </a:endParaRPr>
           </a:p>
           <a:p>
+            <a:pPr lvl="1"/>
+            <a:r>
+              <a:rPr lang="en-GB" sz="1600" dirty="0" err="1">
+                <a:solidFill>
+                  <a:srgbClr val="00CC99"/>
+                </a:solidFill>
+                <a:latin typeface="Consolas" panose="020B0609020204030204" pitchFamily="49" charset="0"/>
+                <a:cs typeface="Segoe UI Light" panose="020B0502040204020203" pitchFamily="34" charset="0"/>
+              </a:rPr>
+              <a:t>IEnumerable</a:t>
+            </a:r>
+            <a:r>
+              <a:rPr lang="en-GB" sz="1600" dirty="0">
+                <a:solidFill>
+                  <a:schemeClr val="bg1">
+                    <a:lumMod val="85000"/>
+                  </a:schemeClr>
+                </a:solidFill>
+                <a:latin typeface="Consolas" panose="020B0609020204030204" pitchFamily="49" charset="0"/>
+                <a:cs typeface="Segoe UI Light" panose="020B0502040204020203" pitchFamily="34" charset="0"/>
+              </a:rPr>
+              <a:t>&lt;</a:t>
+            </a:r>
+            <a:r>
+              <a:rPr lang="en-GB" sz="1600" dirty="0" err="1">
+                <a:solidFill>
+                  <a:srgbClr val="00B0F0"/>
+                </a:solidFill>
+                <a:latin typeface="Consolas" panose="020B0609020204030204" pitchFamily="49" charset="0"/>
+                <a:cs typeface="Segoe UI Light" panose="020B0502040204020203" pitchFamily="34" charset="0"/>
+              </a:rPr>
+              <a:t>int</a:t>
+            </a:r>
+            <a:r>
+              <a:rPr lang="en-GB" sz="1600" dirty="0">
+                <a:solidFill>
+                  <a:schemeClr val="bg1">
+                    <a:lumMod val="85000"/>
+                  </a:schemeClr>
+                </a:solidFill>
+                <a:latin typeface="Consolas" panose="020B0609020204030204" pitchFamily="49" charset="0"/>
+                <a:cs typeface="Segoe UI Light" panose="020B0502040204020203" pitchFamily="34" charset="0"/>
+              </a:rPr>
+              <a:t>&gt; numbers = </a:t>
+            </a:r>
+            <a:r>
+              <a:rPr lang="en-GB" sz="1600" dirty="0" err="1">
+                <a:solidFill>
+                  <a:srgbClr val="00CC99"/>
+                </a:solidFill>
+                <a:latin typeface="Consolas" panose="020B0609020204030204" pitchFamily="49" charset="0"/>
+                <a:cs typeface="Segoe UI Light" panose="020B0502040204020203" pitchFamily="34" charset="0"/>
+              </a:rPr>
+              <a:t>Enumerable</a:t>
+            </a:r>
+            <a:r>
+              <a:rPr lang="en-GB" sz="1600" dirty="0" err="1">
+                <a:solidFill>
+                  <a:schemeClr val="bg1">
+                    <a:lumMod val="85000"/>
+                  </a:schemeClr>
+                </a:solidFill>
+                <a:latin typeface="Consolas" panose="020B0609020204030204" pitchFamily="49" charset="0"/>
+                <a:cs typeface="Segoe UI Light" panose="020B0502040204020203" pitchFamily="34" charset="0"/>
+              </a:rPr>
+              <a:t>.Range</a:t>
+            </a:r>
+            <a:r>
+              <a:rPr lang="en-GB" sz="1600" dirty="0">
+                <a:solidFill>
+                  <a:schemeClr val="bg1">
+                    <a:lumMod val="85000"/>
+                  </a:schemeClr>
+                </a:solidFill>
+                <a:latin typeface="Consolas" panose="020B0609020204030204" pitchFamily="49" charset="0"/>
+                <a:cs typeface="Segoe UI Light" panose="020B0502040204020203" pitchFamily="34" charset="0"/>
+              </a:rPr>
+              <a:t>(1, 100);</a:t>
+            </a:r>
+          </a:p>
+          <a:p>
+            <a:pPr lvl="1"/>
+            <a:endParaRPr lang="en-GB" sz="1600" dirty="0">
+              <a:solidFill>
+                <a:schemeClr val="bg1">
+                  <a:lumMod val="85000"/>
+                </a:schemeClr>
+              </a:solidFill>
+              <a:latin typeface="Consolas" panose="020B0609020204030204" pitchFamily="49" charset="0"/>
+              <a:cs typeface="Segoe UI Light" panose="020B0502040204020203" pitchFamily="34" charset="0"/>
+            </a:endParaRPr>
+          </a:p>
+          <a:p>
+            <a:pPr lvl="1"/>
+            <a:r>
+              <a:rPr lang="en-GB" sz="1600" dirty="0" err="1">
+                <a:solidFill>
+                  <a:srgbClr val="00CC99"/>
+                </a:solidFill>
+                <a:latin typeface="Consolas" panose="020B0609020204030204" pitchFamily="49" charset="0"/>
+                <a:cs typeface="Segoe UI Light" panose="020B0502040204020203" pitchFamily="34" charset="0"/>
+              </a:rPr>
+              <a:t>IEnumerable</a:t>
+            </a:r>
+            <a:r>
+              <a:rPr lang="en-GB" sz="1600" dirty="0">
+                <a:solidFill>
+                  <a:schemeClr val="bg1">
+                    <a:lumMod val="85000"/>
+                  </a:schemeClr>
+                </a:solidFill>
+                <a:latin typeface="Consolas" panose="020B0609020204030204" pitchFamily="49" charset="0"/>
+                <a:cs typeface="Segoe UI Light" panose="020B0502040204020203" pitchFamily="34" charset="0"/>
+              </a:rPr>
+              <a:t>&lt;</a:t>
+            </a:r>
+            <a:r>
+              <a:rPr lang="en-GB" sz="1600" dirty="0" err="1">
+                <a:solidFill>
+                  <a:srgbClr val="00B0F0"/>
+                </a:solidFill>
+                <a:latin typeface="Consolas" panose="020B0609020204030204" pitchFamily="49" charset="0"/>
+                <a:cs typeface="Segoe UI Light" panose="020B0502040204020203" pitchFamily="34" charset="0"/>
+              </a:rPr>
+              <a:t>int</a:t>
+            </a:r>
+            <a:r>
+              <a:rPr lang="en-GB" sz="1600" dirty="0">
+                <a:solidFill>
+                  <a:schemeClr val="bg1">
+                    <a:lumMod val="85000"/>
+                  </a:schemeClr>
+                </a:solidFill>
+                <a:latin typeface="Consolas" panose="020B0609020204030204" pitchFamily="49" charset="0"/>
+                <a:cs typeface="Segoe UI Light" panose="020B0502040204020203" pitchFamily="34" charset="0"/>
+              </a:rPr>
+              <a:t>&gt; </a:t>
+            </a:r>
+            <a:r>
+              <a:rPr lang="en-GB" sz="1600" dirty="0" err="1">
+                <a:solidFill>
+                  <a:schemeClr val="bg1">
+                    <a:lumMod val="85000"/>
+                  </a:schemeClr>
+                </a:solidFill>
+                <a:latin typeface="Consolas" panose="020B0609020204030204" pitchFamily="49" charset="0"/>
+                <a:cs typeface="Segoe UI Light" panose="020B0502040204020203" pitchFamily="34" charset="0"/>
+              </a:rPr>
+              <a:t>evenNumbers</a:t>
+            </a:r>
+            <a:r>
+              <a:rPr lang="en-GB" sz="1600" dirty="0">
+                <a:solidFill>
+                  <a:schemeClr val="bg1">
+                    <a:lumMod val="85000"/>
+                  </a:schemeClr>
+                </a:solidFill>
+                <a:latin typeface="Consolas" panose="020B0609020204030204" pitchFamily="49" charset="0"/>
+                <a:cs typeface="Segoe UI Light" panose="020B0502040204020203" pitchFamily="34" charset="0"/>
+              </a:rPr>
+              <a:t> = numbers</a:t>
+            </a:r>
+          </a:p>
+          <a:p>
+            <a:pPr lvl="1"/>
+            <a:r>
+              <a:rPr lang="en-GB" sz="1600" dirty="0">
+                <a:solidFill>
+                  <a:schemeClr val="bg1">
+                    <a:lumMod val="85000"/>
+                  </a:schemeClr>
+                </a:solidFill>
+                <a:latin typeface="Consolas" panose="020B0609020204030204" pitchFamily="49" charset="0"/>
+                <a:cs typeface="Segoe UI Light" panose="020B0502040204020203" pitchFamily="34" charset="0"/>
+              </a:rPr>
+              <a:t>	.Where(number =&gt; number % 2 == 0);</a:t>
+            </a:r>
+          </a:p>
+          <a:p>
+            <a:pPr lvl="1"/>
+            <a:endParaRPr lang="en-GB" sz="1600" dirty="0">
+              <a:solidFill>
+                <a:schemeClr val="bg1">
+                  <a:lumMod val="85000"/>
+                </a:schemeClr>
+              </a:solidFill>
+              <a:latin typeface="Consolas" panose="020B0609020204030204" pitchFamily="49" charset="0"/>
+              <a:cs typeface="Segoe UI Light" panose="020B0502040204020203" pitchFamily="34" charset="0"/>
+            </a:endParaRPr>
+          </a:p>
+          <a:p>
+            <a:pPr lvl="1"/>
+            <a:r>
+              <a:rPr lang="en-GB" sz="1600" dirty="0" err="1">
+                <a:solidFill>
+                  <a:srgbClr val="00CC99"/>
+                </a:solidFill>
+                <a:latin typeface="Consolas" panose="020B0609020204030204" pitchFamily="49" charset="0"/>
+                <a:cs typeface="Segoe UI Light" panose="020B0502040204020203" pitchFamily="34" charset="0"/>
+              </a:rPr>
+              <a:t>IEnumerable</a:t>
+            </a:r>
+            <a:r>
+              <a:rPr lang="en-GB" sz="1600" dirty="0">
+                <a:solidFill>
+                  <a:schemeClr val="bg1">
+                    <a:lumMod val="85000"/>
+                  </a:schemeClr>
+                </a:solidFill>
+                <a:latin typeface="Consolas" panose="020B0609020204030204" pitchFamily="49" charset="0"/>
+                <a:cs typeface="Segoe UI Light" panose="020B0502040204020203" pitchFamily="34" charset="0"/>
+              </a:rPr>
+              <a:t>&lt;</a:t>
+            </a:r>
+            <a:r>
+              <a:rPr lang="en-GB" sz="1600" dirty="0" err="1">
+                <a:solidFill>
+                  <a:schemeClr val="bg1">
+                    <a:lumMod val="85000"/>
+                  </a:schemeClr>
+                </a:solidFill>
+                <a:latin typeface="Consolas" panose="020B0609020204030204" pitchFamily="49" charset="0"/>
+                <a:cs typeface="Segoe UI Light" panose="020B0502040204020203" pitchFamily="34" charset="0"/>
+              </a:rPr>
+              <a:t>int</a:t>
+            </a:r>
+            <a:r>
+              <a:rPr lang="en-GB" sz="1600" dirty="0">
+                <a:solidFill>
+                  <a:schemeClr val="bg1">
+                    <a:lumMod val="85000"/>
+                  </a:schemeClr>
+                </a:solidFill>
+                <a:latin typeface="Consolas" panose="020B0609020204030204" pitchFamily="49" charset="0"/>
+                <a:cs typeface="Segoe UI Light" panose="020B0502040204020203" pitchFamily="34" charset="0"/>
+              </a:rPr>
+              <a:t>&gt; </a:t>
+            </a:r>
+            <a:r>
+              <a:rPr lang="en-GB" sz="1600" dirty="0" err="1">
+                <a:solidFill>
+                  <a:schemeClr val="bg1">
+                    <a:lumMod val="85000"/>
+                  </a:schemeClr>
+                </a:solidFill>
+                <a:latin typeface="Consolas" panose="020B0609020204030204" pitchFamily="49" charset="0"/>
+                <a:cs typeface="Segoe UI Light" panose="020B0502040204020203" pitchFamily="34" charset="0"/>
+              </a:rPr>
+              <a:t>evenNumbers</a:t>
+            </a:r>
+            <a:r>
+              <a:rPr lang="en-GB" sz="1600" dirty="0">
+                <a:solidFill>
+                  <a:schemeClr val="bg1">
+                    <a:lumMod val="85000"/>
+                  </a:schemeClr>
+                </a:solidFill>
+                <a:latin typeface="Consolas" panose="020B0609020204030204" pitchFamily="49" charset="0"/>
+                <a:cs typeface="Segoe UI Light" panose="020B0502040204020203" pitchFamily="34" charset="0"/>
+              </a:rPr>
+              <a:t> = </a:t>
+            </a:r>
+          </a:p>
+          <a:p>
+            <a:pPr lvl="1"/>
+            <a:r>
+              <a:rPr lang="en-GB" sz="1600" dirty="0">
+                <a:solidFill>
+                  <a:schemeClr val="bg1">
+                    <a:lumMod val="85000"/>
+                  </a:schemeClr>
+                </a:solidFill>
+                <a:latin typeface="Consolas" panose="020B0609020204030204" pitchFamily="49" charset="0"/>
+                <a:cs typeface="Segoe UI Light" panose="020B0502040204020203" pitchFamily="34" charset="0"/>
+              </a:rPr>
+              <a:t>    </a:t>
+            </a:r>
+            <a:r>
+              <a:rPr lang="en-GB" sz="1600" dirty="0">
+                <a:solidFill>
+                  <a:srgbClr val="00B0F0"/>
+                </a:solidFill>
+                <a:latin typeface="Consolas" panose="020B0609020204030204" pitchFamily="49" charset="0"/>
+                <a:cs typeface="Segoe UI Light" panose="020B0502040204020203" pitchFamily="34" charset="0"/>
+              </a:rPr>
+              <a:t>from</a:t>
+            </a:r>
+            <a:r>
+              <a:rPr lang="en-GB" sz="1600" dirty="0">
+                <a:solidFill>
+                  <a:schemeClr val="bg1">
+                    <a:lumMod val="85000"/>
+                  </a:schemeClr>
+                </a:solidFill>
+                <a:latin typeface="Consolas" panose="020B0609020204030204" pitchFamily="49" charset="0"/>
+                <a:cs typeface="Segoe UI Light" panose="020B0502040204020203" pitchFamily="34" charset="0"/>
+              </a:rPr>
+              <a:t> number </a:t>
+            </a:r>
+            <a:r>
+              <a:rPr lang="en-GB" sz="1600" dirty="0">
+                <a:solidFill>
+                  <a:srgbClr val="00B0F0"/>
+                </a:solidFill>
+                <a:latin typeface="Consolas" panose="020B0609020204030204" pitchFamily="49" charset="0"/>
+                <a:cs typeface="Segoe UI Light" panose="020B0502040204020203" pitchFamily="34" charset="0"/>
+              </a:rPr>
+              <a:t>in</a:t>
+            </a:r>
+            <a:r>
+              <a:rPr lang="en-GB" sz="1600" dirty="0">
+                <a:solidFill>
+                  <a:schemeClr val="bg1">
+                    <a:lumMod val="85000"/>
+                  </a:schemeClr>
+                </a:solidFill>
+                <a:latin typeface="Consolas" panose="020B0609020204030204" pitchFamily="49" charset="0"/>
+                <a:cs typeface="Segoe UI Light" panose="020B0502040204020203" pitchFamily="34" charset="0"/>
+              </a:rPr>
+              <a:t> numbers</a:t>
+            </a:r>
+          </a:p>
+          <a:p>
+            <a:pPr lvl="1"/>
+            <a:r>
+              <a:rPr lang="en-GB" sz="1600" dirty="0">
+                <a:solidFill>
+                  <a:schemeClr val="bg1">
+                    <a:lumMod val="85000"/>
+                  </a:schemeClr>
+                </a:solidFill>
+                <a:latin typeface="Consolas" panose="020B0609020204030204" pitchFamily="49" charset="0"/>
+                <a:cs typeface="Segoe UI Light" panose="020B0502040204020203" pitchFamily="34" charset="0"/>
+              </a:rPr>
+              <a:t>    </a:t>
+            </a:r>
+            <a:r>
+              <a:rPr lang="en-GB" sz="1600" dirty="0">
+                <a:solidFill>
+                  <a:srgbClr val="00B0F0"/>
+                </a:solidFill>
+                <a:latin typeface="Consolas" panose="020B0609020204030204" pitchFamily="49" charset="0"/>
+                <a:cs typeface="Segoe UI Light" panose="020B0502040204020203" pitchFamily="34" charset="0"/>
+              </a:rPr>
+              <a:t>where</a:t>
+            </a:r>
+            <a:r>
+              <a:rPr lang="en-GB" sz="1600" dirty="0">
+                <a:solidFill>
+                  <a:schemeClr val="bg1">
+                    <a:lumMod val="85000"/>
+                  </a:schemeClr>
+                </a:solidFill>
+                <a:latin typeface="Consolas" panose="020B0609020204030204" pitchFamily="49" charset="0"/>
+                <a:cs typeface="Segoe UI Light" panose="020B0502040204020203" pitchFamily="34" charset="0"/>
+              </a:rPr>
+              <a:t> number % 2 == 0</a:t>
+            </a:r>
+          </a:p>
+          <a:p>
+            <a:pPr lvl="1"/>
+            <a:r>
+              <a:rPr lang="en-GB" sz="1600" dirty="0">
+                <a:solidFill>
+                  <a:schemeClr val="bg1">
+                    <a:lumMod val="85000"/>
+                  </a:schemeClr>
+                </a:solidFill>
+                <a:latin typeface="Consolas" panose="020B0609020204030204" pitchFamily="49" charset="0"/>
+                <a:cs typeface="Segoe UI Light" panose="020B0502040204020203" pitchFamily="34" charset="0"/>
+              </a:rPr>
+              <a:t>    </a:t>
+            </a:r>
+            <a:r>
+              <a:rPr lang="en-GB" sz="1600" dirty="0">
+                <a:solidFill>
+                  <a:srgbClr val="00B0F0"/>
+                </a:solidFill>
+                <a:latin typeface="Consolas" panose="020B0609020204030204" pitchFamily="49" charset="0"/>
+                <a:cs typeface="Segoe UI Light" panose="020B0502040204020203" pitchFamily="34" charset="0"/>
+              </a:rPr>
+              <a:t>select</a:t>
+            </a:r>
+            <a:r>
+              <a:rPr lang="en-GB" sz="1600" dirty="0">
+                <a:solidFill>
+                  <a:schemeClr val="bg1">
+                    <a:lumMod val="85000"/>
+                  </a:schemeClr>
+                </a:solidFill>
+                <a:latin typeface="Consolas" panose="020B0609020204030204" pitchFamily="49" charset="0"/>
+                <a:cs typeface="Segoe UI Light" panose="020B0502040204020203" pitchFamily="34" charset="0"/>
+              </a:rPr>
+              <a:t> number;</a:t>
+            </a:r>
+          </a:p>
+          <a:p>
+            <a:pPr lvl="1"/>
+            <a:endParaRPr lang="en-GB" sz="1600" dirty="0">
+              <a:solidFill>
+                <a:schemeClr val="bg1">
+                  <a:lumMod val="85000"/>
+                </a:schemeClr>
+              </a:solidFill>
+              <a:latin typeface="Consolas" panose="020B0609020204030204" pitchFamily="49" charset="0"/>
+              <a:cs typeface="Segoe UI Light" panose="020B0502040204020203" pitchFamily="34" charset="0"/>
+            </a:endParaRPr>
+          </a:p>
+          <a:p>
+            <a:pPr lvl="1"/>
+            <a:endParaRPr lang="en-GB" sz="1600" dirty="0">
+              <a:solidFill>
+                <a:schemeClr val="bg1">
+                  <a:lumMod val="85000"/>
+                </a:schemeClr>
+              </a:solidFill>
+              <a:latin typeface="Consolas" panose="020B0609020204030204" pitchFamily="49" charset="0"/>
+              <a:cs typeface="Segoe UI Light" panose="020B0502040204020203" pitchFamily="34" charset="0"/>
+            </a:endParaRPr>
+          </a:p>
+          <a:p>
+            <a:pPr lvl="1"/>
+            <a:r>
+              <a:rPr lang="en-GB" sz="1600" dirty="0" err="1">
+                <a:solidFill>
+                  <a:srgbClr val="00CC99"/>
+                </a:solidFill>
+                <a:latin typeface="Consolas" panose="020B0609020204030204" pitchFamily="49" charset="0"/>
+                <a:cs typeface="Segoe UI Light" panose="020B0502040204020203" pitchFamily="34" charset="0"/>
+              </a:rPr>
+              <a:t>IEnumerable</a:t>
+            </a:r>
+            <a:r>
+              <a:rPr lang="en-GB" sz="1600" dirty="0">
+                <a:solidFill>
+                  <a:schemeClr val="bg1">
+                    <a:lumMod val="85000"/>
+                  </a:schemeClr>
+                </a:solidFill>
+                <a:latin typeface="Consolas" panose="020B0609020204030204" pitchFamily="49" charset="0"/>
+                <a:cs typeface="Segoe UI Light" panose="020B0502040204020203" pitchFamily="34" charset="0"/>
+              </a:rPr>
+              <a:t>&lt;</a:t>
+            </a:r>
+            <a:r>
+              <a:rPr lang="en-GB" sz="1600" dirty="0">
+                <a:solidFill>
+                  <a:srgbClr val="00B0F0"/>
+                </a:solidFill>
+                <a:latin typeface="Consolas" panose="020B0609020204030204" pitchFamily="49" charset="0"/>
+                <a:cs typeface="Segoe UI Light" panose="020B0502040204020203" pitchFamily="34" charset="0"/>
+              </a:rPr>
+              <a:t>string</a:t>
+            </a:r>
+            <a:r>
+              <a:rPr lang="en-GB" sz="1600" dirty="0">
+                <a:solidFill>
+                  <a:schemeClr val="bg1">
+                    <a:lumMod val="85000"/>
+                  </a:schemeClr>
+                </a:solidFill>
+                <a:latin typeface="Consolas" panose="020B0609020204030204" pitchFamily="49" charset="0"/>
+                <a:cs typeface="Segoe UI Light" panose="020B0502040204020203" pitchFamily="34" charset="0"/>
+              </a:rPr>
+              <a:t>&gt; names = </a:t>
+            </a:r>
+            <a:r>
+              <a:rPr lang="en-GB" sz="1600" dirty="0">
+                <a:solidFill>
+                  <a:srgbClr val="00B0F0"/>
+                </a:solidFill>
+                <a:latin typeface="Consolas" panose="020B0609020204030204" pitchFamily="49" charset="0"/>
+                <a:cs typeface="Segoe UI Light" panose="020B0502040204020203" pitchFamily="34" charset="0"/>
+              </a:rPr>
+              <a:t>new</a:t>
+            </a:r>
+            <a:r>
+              <a:rPr lang="en-GB" sz="1600" dirty="0">
+                <a:solidFill>
+                  <a:schemeClr val="bg1">
+                    <a:lumMod val="85000"/>
+                  </a:schemeClr>
+                </a:solidFill>
+                <a:latin typeface="Consolas" panose="020B0609020204030204" pitchFamily="49" charset="0"/>
+                <a:cs typeface="Segoe UI Light" panose="020B0502040204020203" pitchFamily="34" charset="0"/>
+              </a:rPr>
+              <a:t> </a:t>
+            </a:r>
+            <a:r>
+              <a:rPr lang="en-GB" sz="1600" dirty="0">
+                <a:solidFill>
+                  <a:srgbClr val="00B0F0"/>
+                </a:solidFill>
+                <a:latin typeface="Consolas" panose="020B0609020204030204" pitchFamily="49" charset="0"/>
+                <a:cs typeface="Segoe UI Light" panose="020B0502040204020203" pitchFamily="34" charset="0"/>
+              </a:rPr>
+              <a:t>string</a:t>
+            </a:r>
+            <a:r>
+              <a:rPr lang="en-GB" sz="1600" dirty="0">
+                <a:solidFill>
+                  <a:schemeClr val="bg1">
+                    <a:lumMod val="85000"/>
+                  </a:schemeClr>
+                </a:solidFill>
+                <a:latin typeface="Consolas" panose="020B0609020204030204" pitchFamily="49" charset="0"/>
+                <a:cs typeface="Segoe UI Light" panose="020B0502040204020203" pitchFamily="34" charset="0"/>
+              </a:rPr>
+              <a:t>[] { </a:t>
+            </a:r>
+            <a:r>
+              <a:rPr lang="en-GB" sz="1600" dirty="0">
+                <a:solidFill>
+                  <a:srgbClr val="C00000"/>
+                </a:solidFill>
+                <a:latin typeface="Consolas" panose="020B0609020204030204" pitchFamily="49" charset="0"/>
+                <a:cs typeface="Segoe UI Light" panose="020B0502040204020203" pitchFamily="34" charset="0"/>
+              </a:rPr>
+              <a:t>"Alice"</a:t>
+            </a:r>
+            <a:r>
+              <a:rPr lang="en-GB" sz="1600" dirty="0">
+                <a:solidFill>
+                  <a:schemeClr val="bg1">
+                    <a:lumMod val="85000"/>
+                  </a:schemeClr>
+                </a:solidFill>
+                <a:latin typeface="Consolas" panose="020B0609020204030204" pitchFamily="49" charset="0"/>
+                <a:cs typeface="Segoe UI Light" panose="020B0502040204020203" pitchFamily="34" charset="0"/>
+              </a:rPr>
+              <a:t>, </a:t>
+            </a:r>
+            <a:r>
+              <a:rPr lang="en-GB" sz="1600" dirty="0">
+                <a:solidFill>
+                  <a:srgbClr val="C00000"/>
+                </a:solidFill>
+                <a:latin typeface="Consolas" panose="020B0609020204030204" pitchFamily="49" charset="0"/>
+                <a:cs typeface="Segoe UI Light" panose="020B0502040204020203" pitchFamily="34" charset="0"/>
+              </a:rPr>
+              <a:t>"Bob"</a:t>
+            </a:r>
+            <a:r>
+              <a:rPr lang="en-GB" sz="1600" dirty="0">
+                <a:solidFill>
+                  <a:schemeClr val="bg1">
+                    <a:lumMod val="85000"/>
+                  </a:schemeClr>
+                </a:solidFill>
+                <a:latin typeface="Consolas" panose="020B0609020204030204" pitchFamily="49" charset="0"/>
+                <a:cs typeface="Segoe UI Light" panose="020B0502040204020203" pitchFamily="34" charset="0"/>
+              </a:rPr>
+              <a:t>, </a:t>
+            </a:r>
+            <a:r>
+              <a:rPr lang="en-GB" sz="1600" dirty="0">
+                <a:solidFill>
+                  <a:srgbClr val="C00000"/>
+                </a:solidFill>
+                <a:latin typeface="Consolas" panose="020B0609020204030204" pitchFamily="49" charset="0"/>
+                <a:cs typeface="Segoe UI Light" panose="020B0502040204020203" pitchFamily="34" charset="0"/>
+              </a:rPr>
+              <a:t>"Charlie"</a:t>
+            </a:r>
+            <a:r>
+              <a:rPr lang="en-GB" sz="1600" dirty="0">
+                <a:solidFill>
+                  <a:schemeClr val="bg1">
+                    <a:lumMod val="85000"/>
+                  </a:schemeClr>
+                </a:solidFill>
+                <a:latin typeface="Consolas" panose="020B0609020204030204" pitchFamily="49" charset="0"/>
+                <a:cs typeface="Segoe UI Light" panose="020B0502040204020203" pitchFamily="34" charset="0"/>
+              </a:rPr>
+              <a:t> };</a:t>
+            </a:r>
+          </a:p>
+          <a:p>
+            <a:pPr lvl="1"/>
+            <a:endParaRPr lang="en-GB" sz="1600" dirty="0">
+              <a:solidFill>
+                <a:schemeClr val="bg1">
+                  <a:lumMod val="85000"/>
+                </a:schemeClr>
+              </a:solidFill>
+              <a:latin typeface="Consolas" panose="020B0609020204030204" pitchFamily="49" charset="0"/>
+              <a:cs typeface="Segoe UI Light" panose="020B0502040204020203" pitchFamily="34" charset="0"/>
+            </a:endParaRPr>
+          </a:p>
+          <a:p>
+            <a:pPr lvl="1"/>
+            <a:r>
+              <a:rPr lang="en-GB" sz="1600" dirty="0" err="1">
+                <a:solidFill>
+                  <a:srgbClr val="00CC99"/>
+                </a:solidFill>
+                <a:latin typeface="Consolas" panose="020B0609020204030204" pitchFamily="49" charset="0"/>
+                <a:cs typeface="Segoe UI Light" panose="020B0502040204020203" pitchFamily="34" charset="0"/>
+              </a:rPr>
+              <a:t>IEnumerable</a:t>
+            </a:r>
+            <a:r>
+              <a:rPr lang="en-GB" sz="1600" dirty="0">
+                <a:solidFill>
+                  <a:schemeClr val="bg1">
+                    <a:lumMod val="85000"/>
+                  </a:schemeClr>
+                </a:solidFill>
+                <a:latin typeface="Consolas" panose="020B0609020204030204" pitchFamily="49" charset="0"/>
+                <a:cs typeface="Segoe UI Light" panose="020B0502040204020203" pitchFamily="34" charset="0"/>
+              </a:rPr>
+              <a:t>&lt;</a:t>
+            </a:r>
+            <a:r>
+              <a:rPr lang="en-GB" sz="1600" dirty="0">
+                <a:solidFill>
+                  <a:srgbClr val="00B0F0"/>
+                </a:solidFill>
+                <a:latin typeface="Consolas" panose="020B0609020204030204" pitchFamily="49" charset="0"/>
+                <a:cs typeface="Segoe UI Light" panose="020B0502040204020203" pitchFamily="34" charset="0"/>
+              </a:rPr>
+              <a:t>string</a:t>
+            </a:r>
+            <a:r>
+              <a:rPr lang="en-GB" sz="1600" dirty="0">
+                <a:solidFill>
+                  <a:schemeClr val="bg1">
+                    <a:lumMod val="85000"/>
+                  </a:schemeClr>
+                </a:solidFill>
+                <a:latin typeface="Consolas" panose="020B0609020204030204" pitchFamily="49" charset="0"/>
+                <a:cs typeface="Segoe UI Light" panose="020B0502040204020203" pitchFamily="34" charset="0"/>
+              </a:rPr>
+              <a:t>&gt; </a:t>
+            </a:r>
+            <a:r>
+              <a:rPr lang="en-GB" sz="1600" dirty="0" err="1">
+                <a:solidFill>
+                  <a:schemeClr val="bg1">
+                    <a:lumMod val="85000"/>
+                  </a:schemeClr>
+                </a:solidFill>
+                <a:latin typeface="Consolas" panose="020B0609020204030204" pitchFamily="49" charset="0"/>
+                <a:cs typeface="Segoe UI Light" panose="020B0502040204020203" pitchFamily="34" charset="0"/>
+              </a:rPr>
+              <a:t>selectedNames</a:t>
+            </a:r>
+            <a:r>
+              <a:rPr lang="en-GB" sz="1600" dirty="0">
+                <a:solidFill>
+                  <a:schemeClr val="bg1">
+                    <a:lumMod val="85000"/>
+                  </a:schemeClr>
+                </a:solidFill>
+                <a:latin typeface="Consolas" panose="020B0609020204030204" pitchFamily="49" charset="0"/>
+                <a:cs typeface="Segoe UI Light" panose="020B0502040204020203" pitchFamily="34" charset="0"/>
+              </a:rPr>
+              <a:t> = names</a:t>
+            </a:r>
+          </a:p>
+          <a:p>
+            <a:pPr lvl="1"/>
+            <a:r>
+              <a:rPr lang="en-GB" sz="1600" dirty="0">
+                <a:solidFill>
+                  <a:schemeClr val="bg1">
+                    <a:lumMod val="85000"/>
+                  </a:schemeClr>
+                </a:solidFill>
+                <a:latin typeface="Consolas" panose="020B0609020204030204" pitchFamily="49" charset="0"/>
+                <a:cs typeface="Segoe UI Light" panose="020B0502040204020203" pitchFamily="34" charset="0"/>
+              </a:rPr>
+              <a:t>    .Where(name =&gt; </a:t>
+            </a:r>
+            <a:r>
+              <a:rPr lang="en-GB" sz="1600" dirty="0" err="1">
+                <a:solidFill>
+                  <a:schemeClr val="bg1">
+                    <a:lumMod val="85000"/>
+                  </a:schemeClr>
+                </a:solidFill>
+                <a:latin typeface="Consolas" panose="020B0609020204030204" pitchFamily="49" charset="0"/>
+                <a:cs typeface="Segoe UI Light" panose="020B0502040204020203" pitchFamily="34" charset="0"/>
+              </a:rPr>
+              <a:t>name.ToLower</a:t>
+            </a:r>
+            <a:r>
+              <a:rPr lang="en-GB" sz="1600" dirty="0">
+                <a:solidFill>
+                  <a:schemeClr val="bg1">
+                    <a:lumMod val="85000"/>
+                  </a:schemeClr>
+                </a:solidFill>
+                <a:latin typeface="Consolas" panose="020B0609020204030204" pitchFamily="49" charset="0"/>
+                <a:cs typeface="Segoe UI Light" panose="020B0502040204020203" pitchFamily="34" charset="0"/>
+              </a:rPr>
+              <a:t>().Contains(</a:t>
+            </a:r>
+            <a:r>
+              <a:rPr lang="en-GB" sz="1600" dirty="0">
+                <a:solidFill>
+                  <a:srgbClr val="C00000"/>
+                </a:solidFill>
+                <a:latin typeface="Consolas" panose="020B0609020204030204" pitchFamily="49" charset="0"/>
+                <a:cs typeface="Segoe UI Light" panose="020B0502040204020203" pitchFamily="34" charset="0"/>
+              </a:rPr>
+              <a:t>"a"</a:t>
+            </a:r>
+            <a:r>
+              <a:rPr lang="en-GB" sz="1600" dirty="0">
+                <a:solidFill>
+                  <a:schemeClr val="bg1">
+                    <a:lumMod val="85000"/>
+                  </a:schemeClr>
+                </a:solidFill>
+                <a:latin typeface="Consolas" panose="020B0609020204030204" pitchFamily="49" charset="0"/>
+                <a:cs typeface="Segoe UI Light" panose="020B0502040204020203" pitchFamily="34" charset="0"/>
+              </a:rPr>
+              <a:t>))</a:t>
+            </a:r>
+          </a:p>
+          <a:p>
+            <a:pPr lvl="1"/>
+            <a:r>
+              <a:rPr lang="en-GB" sz="1600" dirty="0">
+                <a:solidFill>
+                  <a:schemeClr val="bg1">
+                    <a:lumMod val="85000"/>
+                  </a:schemeClr>
+                </a:solidFill>
+                <a:latin typeface="Consolas" panose="020B0609020204030204" pitchFamily="49" charset="0"/>
+                <a:cs typeface="Segoe UI Light" panose="020B0502040204020203" pitchFamily="34" charset="0"/>
+              </a:rPr>
+              <a:t>	.Select(name =&gt; </a:t>
+            </a:r>
+            <a:r>
+              <a:rPr lang="en-GB" sz="1600" dirty="0" err="1">
+                <a:solidFill>
+                  <a:schemeClr val="bg1">
+                    <a:lumMod val="85000"/>
+                  </a:schemeClr>
+                </a:solidFill>
+                <a:latin typeface="Consolas" panose="020B0609020204030204" pitchFamily="49" charset="0"/>
+                <a:cs typeface="Segoe UI Light" panose="020B0502040204020203" pitchFamily="34" charset="0"/>
+              </a:rPr>
+              <a:t>name.ToUpper</a:t>
+            </a:r>
+            <a:r>
+              <a:rPr lang="en-GB" sz="1600" dirty="0">
+                <a:solidFill>
+                  <a:schemeClr val="bg1">
+                    <a:lumMod val="85000"/>
+                  </a:schemeClr>
+                </a:solidFill>
+                <a:latin typeface="Consolas" panose="020B0609020204030204" pitchFamily="49" charset="0"/>
+                <a:cs typeface="Segoe UI Light" panose="020B0502040204020203" pitchFamily="34" charset="0"/>
+              </a:rPr>
+              <a:t>());</a:t>
+            </a:r>
+          </a:p>
+          <a:p>
+            <a:pPr lvl="1"/>
+            <a:endParaRPr lang="en-GB" sz="1600" dirty="0">
+              <a:solidFill>
+                <a:schemeClr val="bg1">
+                  <a:lumMod val="85000"/>
+                </a:schemeClr>
+              </a:solidFill>
+              <a:latin typeface="Consolas" panose="020B0609020204030204" pitchFamily="49" charset="0"/>
+              <a:cs typeface="Segoe UI Light" panose="020B0502040204020203" pitchFamily="34" charset="0"/>
+            </a:endParaRPr>
+          </a:p>
+          <a:p>
+            <a:pPr lvl="1"/>
+            <a:r>
+              <a:rPr lang="en-GB" sz="1600" dirty="0" err="1">
+                <a:solidFill>
+                  <a:srgbClr val="00CC99"/>
+                </a:solidFill>
+                <a:latin typeface="Consolas" panose="020B0609020204030204" pitchFamily="49" charset="0"/>
+                <a:cs typeface="Segoe UI Light" panose="020B0502040204020203" pitchFamily="34" charset="0"/>
+              </a:rPr>
+              <a:t>IEnumerable</a:t>
+            </a:r>
+            <a:r>
+              <a:rPr lang="en-GB" sz="1600" dirty="0">
+                <a:solidFill>
+                  <a:schemeClr val="bg1">
+                    <a:lumMod val="85000"/>
+                  </a:schemeClr>
+                </a:solidFill>
+                <a:latin typeface="Consolas" panose="020B0609020204030204" pitchFamily="49" charset="0"/>
+                <a:cs typeface="Segoe UI Light" panose="020B0502040204020203" pitchFamily="34" charset="0"/>
+              </a:rPr>
+              <a:t>&lt;</a:t>
+            </a:r>
+            <a:r>
+              <a:rPr lang="en-GB" sz="1600" dirty="0">
+                <a:solidFill>
+                  <a:srgbClr val="00B0F0"/>
+                </a:solidFill>
+                <a:latin typeface="Consolas" panose="020B0609020204030204" pitchFamily="49" charset="0"/>
+                <a:cs typeface="Segoe UI Light" panose="020B0502040204020203" pitchFamily="34" charset="0"/>
+              </a:rPr>
+              <a:t>string</a:t>
+            </a:r>
+            <a:r>
+              <a:rPr lang="en-GB" sz="1600" dirty="0">
+                <a:solidFill>
+                  <a:schemeClr val="bg1">
+                    <a:lumMod val="85000"/>
+                  </a:schemeClr>
+                </a:solidFill>
+                <a:latin typeface="Consolas" panose="020B0609020204030204" pitchFamily="49" charset="0"/>
+                <a:cs typeface="Segoe UI Light" panose="020B0502040204020203" pitchFamily="34" charset="0"/>
+              </a:rPr>
+              <a:t>&gt; </a:t>
+            </a:r>
+            <a:r>
+              <a:rPr lang="en-GB" sz="1600" dirty="0" err="1">
+                <a:solidFill>
+                  <a:schemeClr val="bg1">
+                    <a:lumMod val="85000"/>
+                  </a:schemeClr>
+                </a:solidFill>
+                <a:latin typeface="Consolas" panose="020B0609020204030204" pitchFamily="49" charset="0"/>
+                <a:cs typeface="Segoe UI Light" panose="020B0502040204020203" pitchFamily="34" charset="0"/>
+              </a:rPr>
+              <a:t>selectedNames</a:t>
+            </a:r>
+            <a:r>
+              <a:rPr lang="en-GB" sz="1600" dirty="0">
+                <a:solidFill>
+                  <a:schemeClr val="bg1">
+                    <a:lumMod val="85000"/>
+                  </a:schemeClr>
+                </a:solidFill>
+                <a:latin typeface="Consolas" panose="020B0609020204030204" pitchFamily="49" charset="0"/>
+                <a:cs typeface="Segoe UI Light" panose="020B0502040204020203" pitchFamily="34" charset="0"/>
+              </a:rPr>
+              <a:t> =</a:t>
+            </a:r>
+          </a:p>
+          <a:p>
+            <a:pPr lvl="1"/>
+            <a:r>
+              <a:rPr lang="en-GB" sz="1600" dirty="0">
+                <a:solidFill>
+                  <a:schemeClr val="bg1">
+                    <a:lumMod val="85000"/>
+                  </a:schemeClr>
+                </a:solidFill>
+                <a:latin typeface="Consolas" panose="020B0609020204030204" pitchFamily="49" charset="0"/>
+                <a:cs typeface="Segoe UI Light" panose="020B0502040204020203" pitchFamily="34" charset="0"/>
+              </a:rPr>
+              <a:t>    </a:t>
+            </a:r>
+            <a:r>
+              <a:rPr lang="en-GB" sz="1600" dirty="0">
+                <a:solidFill>
+                  <a:srgbClr val="00B0F0"/>
+                </a:solidFill>
+                <a:latin typeface="Consolas" panose="020B0609020204030204" pitchFamily="49" charset="0"/>
+                <a:cs typeface="Segoe UI Light" panose="020B0502040204020203" pitchFamily="34" charset="0"/>
+              </a:rPr>
+              <a:t>from</a:t>
+            </a:r>
+            <a:r>
+              <a:rPr lang="en-GB" sz="1600" dirty="0">
+                <a:solidFill>
+                  <a:schemeClr val="bg1">
+                    <a:lumMod val="85000"/>
+                  </a:schemeClr>
+                </a:solidFill>
+                <a:latin typeface="Consolas" panose="020B0609020204030204" pitchFamily="49" charset="0"/>
+                <a:cs typeface="Segoe UI Light" panose="020B0502040204020203" pitchFamily="34" charset="0"/>
+              </a:rPr>
+              <a:t> name </a:t>
+            </a:r>
+            <a:r>
+              <a:rPr lang="en-GB" sz="1600" dirty="0">
+                <a:solidFill>
+                  <a:srgbClr val="00B0F0"/>
+                </a:solidFill>
+                <a:latin typeface="Consolas" panose="020B0609020204030204" pitchFamily="49" charset="0"/>
+                <a:cs typeface="Segoe UI Light" panose="020B0502040204020203" pitchFamily="34" charset="0"/>
+              </a:rPr>
+              <a:t>in</a:t>
+            </a:r>
+            <a:r>
+              <a:rPr lang="en-GB" sz="1600" dirty="0">
+                <a:solidFill>
+                  <a:schemeClr val="bg1">
+                    <a:lumMod val="85000"/>
+                  </a:schemeClr>
+                </a:solidFill>
+                <a:latin typeface="Consolas" panose="020B0609020204030204" pitchFamily="49" charset="0"/>
+                <a:cs typeface="Segoe UI Light" panose="020B0502040204020203" pitchFamily="34" charset="0"/>
+              </a:rPr>
+              <a:t> names</a:t>
+            </a:r>
+          </a:p>
+          <a:p>
+            <a:pPr lvl="1"/>
+            <a:r>
+              <a:rPr lang="en-GB" sz="1600" dirty="0">
+                <a:solidFill>
+                  <a:schemeClr val="bg1">
+                    <a:lumMod val="85000"/>
+                  </a:schemeClr>
+                </a:solidFill>
+                <a:latin typeface="Consolas" panose="020B0609020204030204" pitchFamily="49" charset="0"/>
+                <a:cs typeface="Segoe UI Light" panose="020B0502040204020203" pitchFamily="34" charset="0"/>
+              </a:rPr>
+              <a:t>    </a:t>
+            </a:r>
+            <a:r>
+              <a:rPr lang="en-GB" sz="1600" dirty="0">
+                <a:solidFill>
+                  <a:srgbClr val="00B0F0"/>
+                </a:solidFill>
+                <a:latin typeface="Consolas" panose="020B0609020204030204" pitchFamily="49" charset="0"/>
+                <a:cs typeface="Segoe UI Light" panose="020B0502040204020203" pitchFamily="34" charset="0"/>
+              </a:rPr>
+              <a:t>where</a:t>
+            </a:r>
+            <a:r>
+              <a:rPr lang="en-GB" sz="1600" dirty="0">
+                <a:solidFill>
+                  <a:schemeClr val="bg1">
+                    <a:lumMod val="85000"/>
+                  </a:schemeClr>
+                </a:solidFill>
+                <a:latin typeface="Consolas" panose="020B0609020204030204" pitchFamily="49" charset="0"/>
+                <a:cs typeface="Segoe UI Light" panose="020B0502040204020203" pitchFamily="34" charset="0"/>
+              </a:rPr>
+              <a:t> </a:t>
+            </a:r>
+            <a:r>
+              <a:rPr lang="en-GB" sz="1600" dirty="0" err="1">
+                <a:solidFill>
+                  <a:schemeClr val="bg1">
+                    <a:lumMod val="85000"/>
+                  </a:schemeClr>
+                </a:solidFill>
+                <a:latin typeface="Consolas" panose="020B0609020204030204" pitchFamily="49" charset="0"/>
+                <a:cs typeface="Segoe UI Light" panose="020B0502040204020203" pitchFamily="34" charset="0"/>
+              </a:rPr>
+              <a:t>name.ToLower</a:t>
+            </a:r>
+            <a:r>
+              <a:rPr lang="en-GB" sz="1600" dirty="0">
+                <a:solidFill>
+                  <a:schemeClr val="bg1">
+                    <a:lumMod val="85000"/>
+                  </a:schemeClr>
+                </a:solidFill>
+                <a:latin typeface="Consolas" panose="020B0609020204030204" pitchFamily="49" charset="0"/>
+                <a:cs typeface="Segoe UI Light" panose="020B0502040204020203" pitchFamily="34" charset="0"/>
+              </a:rPr>
+              <a:t>().Contains(</a:t>
+            </a:r>
+            <a:r>
+              <a:rPr lang="en-GB" sz="1600" dirty="0">
+                <a:solidFill>
+                  <a:srgbClr val="C00000"/>
+                </a:solidFill>
+                <a:latin typeface="Consolas" panose="020B0609020204030204" pitchFamily="49" charset="0"/>
+                <a:cs typeface="Segoe UI Light" panose="020B0502040204020203" pitchFamily="34" charset="0"/>
+              </a:rPr>
+              <a:t>"a"</a:t>
+            </a:r>
+            <a:r>
+              <a:rPr lang="en-GB" sz="1600" dirty="0">
+                <a:solidFill>
+                  <a:schemeClr val="bg1">
+                    <a:lumMod val="85000"/>
+                  </a:schemeClr>
+                </a:solidFill>
+                <a:latin typeface="Consolas" panose="020B0609020204030204" pitchFamily="49" charset="0"/>
+                <a:cs typeface="Segoe UI Light" panose="020B0502040204020203" pitchFamily="34" charset="0"/>
+              </a:rPr>
+              <a:t>)</a:t>
+            </a:r>
+          </a:p>
+          <a:p>
+            <a:pPr lvl="1"/>
+            <a:r>
+              <a:rPr lang="en-GB" sz="1600" dirty="0">
+                <a:solidFill>
+                  <a:schemeClr val="bg1">
+                    <a:lumMod val="85000"/>
+                  </a:schemeClr>
+                </a:solidFill>
+                <a:latin typeface="Consolas" panose="020B0609020204030204" pitchFamily="49" charset="0"/>
+                <a:cs typeface="Segoe UI Light" panose="020B0502040204020203" pitchFamily="34" charset="0"/>
+              </a:rPr>
+              <a:t>    </a:t>
+            </a:r>
+            <a:r>
+              <a:rPr lang="en-GB" sz="1600" dirty="0">
+                <a:solidFill>
+                  <a:srgbClr val="00B0F0"/>
+                </a:solidFill>
+                <a:latin typeface="Consolas" panose="020B0609020204030204" pitchFamily="49" charset="0"/>
+                <a:cs typeface="Segoe UI Light" panose="020B0502040204020203" pitchFamily="34" charset="0"/>
+              </a:rPr>
+              <a:t>select</a:t>
+            </a:r>
+            <a:r>
+              <a:rPr lang="en-GB" sz="1600" dirty="0">
+                <a:solidFill>
+                  <a:schemeClr val="bg1">
+                    <a:lumMod val="85000"/>
+                  </a:schemeClr>
+                </a:solidFill>
+                <a:latin typeface="Consolas" panose="020B0609020204030204" pitchFamily="49" charset="0"/>
+                <a:cs typeface="Segoe UI Light" panose="020B0502040204020203" pitchFamily="34" charset="0"/>
+              </a:rPr>
+              <a:t> </a:t>
+            </a:r>
+            <a:r>
+              <a:rPr lang="en-GB" sz="1600" dirty="0" err="1">
+                <a:solidFill>
+                  <a:schemeClr val="bg1">
+                    <a:lumMod val="85000"/>
+                  </a:schemeClr>
+                </a:solidFill>
+                <a:latin typeface="Consolas" panose="020B0609020204030204" pitchFamily="49" charset="0"/>
+                <a:cs typeface="Segoe UI Light" panose="020B0502040204020203" pitchFamily="34" charset="0"/>
+              </a:rPr>
+              <a:t>name.ToUpper</a:t>
+            </a:r>
+            <a:r>
+              <a:rPr lang="en-GB" sz="1600" dirty="0">
+                <a:solidFill>
+                  <a:schemeClr val="bg1">
+                    <a:lumMod val="85000"/>
+                  </a:schemeClr>
+                </a:solidFill>
+                <a:latin typeface="Consolas" panose="020B0609020204030204" pitchFamily="49" charset="0"/>
+                <a:cs typeface="Segoe UI Light" panose="020B0502040204020203" pitchFamily="34" charset="0"/>
+              </a:rPr>
+              <a:t>();</a:t>
+            </a:r>
+          </a:p>
+          <a:p>
+            <a:pPr lvl="1"/>
+            <a:endParaRPr lang="en-GB" sz="1600" dirty="0">
+              <a:solidFill>
+                <a:srgbClr val="00B0F0"/>
+              </a:solidFill>
+              <a:latin typeface="Consolas" panose="020B0609020204030204" pitchFamily="49" charset="0"/>
+              <a:cs typeface="Segoe UI Light" panose="020B0502040204020203" pitchFamily="34" charset="0"/>
+            </a:endParaRPr>
+          </a:p>
+        </p:txBody>
+      </p:sp>
+    </p:spTree>
+    <p:extLst>
+      <p:ext uri="{BB962C8B-B14F-4D97-AF65-F5344CB8AC3E}">
+        <p14:creationId xmlns:p14="http://schemas.microsoft.com/office/powerpoint/2010/main" val="2547598975"/>
+      </p:ext>
+    </p:extLst>
+  </p:cSld>
+  <p:clrMapOvr>
+    <a:masterClrMapping/>
+  </p:clrMapOvr>
+</p:sld>
+</file>
+
+<file path=ppt/slides/slide18.xml><?xml version="1.0" encoding="utf-8"?>
+<p:sld xmlns:a="http://schemas.openxmlformats.org/drawingml/2006/main" xmlns:r="http://schemas.openxmlformats.org/officeDocument/2006/relationships" xmlns:p="http://schemas.openxmlformats.org/presentationml/2006/main">
+  <p:cSld>
+    <p:bg>
+      <p:bgPr>
+        <a:solidFill>
+          <a:schemeClr val="tx1">
+            <a:lumMod val="85000"/>
+            <a:lumOff val="15000"/>
+          </a:schemeClr>
+        </a:solidFill>
+        <a:effectLst/>
+      </p:bgPr>
+    </p:bg>
+    <p:spTree>
+      <p:nvGrpSpPr>
+        <p:cNvPr id="1" name=""/>
+        <p:cNvGrpSpPr/>
+        <p:nvPr/>
+      </p:nvGrpSpPr>
+      <p:grpSpPr>
+        <a:xfrm>
+          <a:off x="0" y="0"/>
+          <a:ext cx="0" cy="0"/>
+          <a:chOff x="0" y="0"/>
+          <a:chExt cx="0" cy="0"/>
+        </a:xfrm>
+      </p:grpSpPr>
+      <p:sp>
+        <p:nvSpPr>
+          <p:cNvPr id="2" name="Rectangle 1">
+            <a:extLst>
+              <a:ext uri="{FF2B5EF4-FFF2-40B4-BE49-F238E27FC236}">
+                <a16:creationId xmlns:a16="http://schemas.microsoft.com/office/drawing/2014/main" id="{C37E870D-719F-4FC6-B626-43A222821F41}"/>
+              </a:ext>
+            </a:extLst>
+          </p:cNvPr>
+          <p:cNvSpPr/>
+          <p:nvPr/>
+        </p:nvSpPr>
+        <p:spPr>
+          <a:xfrm>
+            <a:off x="0" y="0"/>
+            <a:ext cx="12192000" cy="666656"/>
+          </a:xfrm>
+          <a:prstGeom prst="rect">
+            <a:avLst/>
+          </a:prstGeom>
+          <a:solidFill>
+            <a:schemeClr val="tx1">
+              <a:lumMod val="95000"/>
+              <a:lumOff val="5000"/>
+            </a:schemeClr>
+          </a:solidFill>
+          <a:ln>
+            <a:noFill/>
+          </a:ln>
+        </p:spPr>
+        <p:style>
+          <a:lnRef idx="2">
+            <a:schemeClr val="accent1">
+              <a:shade val="50000"/>
+            </a:schemeClr>
+          </a:lnRef>
+          <a:fillRef idx="1">
+            <a:schemeClr val="accent1"/>
+          </a:fillRef>
+          <a:effectRef idx="0">
+            <a:schemeClr val="accent1"/>
+          </a:effectRef>
+          <a:fontRef idx="minor">
+            <a:schemeClr val="lt1"/>
+          </a:fontRef>
+        </p:style>
+        <p:txBody>
+          <a:bodyPr rtlCol="0" anchor="ctr"/>
+          <a:lstStyle/>
+          <a:p>
+            <a:pPr lvl="1"/>
+            <a:r>
+              <a:rPr lang="en-GB" sz="2400" dirty="0">
+                <a:latin typeface="Segoe UI Light" panose="020B0502040204020203" pitchFamily="34" charset="0"/>
+                <a:cs typeface="Segoe UI Light" panose="020B0502040204020203" pitchFamily="34" charset="0"/>
+              </a:rPr>
+              <a:t>Keywords</a:t>
+            </a:r>
+          </a:p>
+        </p:txBody>
+      </p:sp>
+      <p:pic>
+        <p:nvPicPr>
+          <p:cNvPr id="7" name="Picture 6">
+            <a:extLst>
+              <a:ext uri="{FF2B5EF4-FFF2-40B4-BE49-F238E27FC236}">
+                <a16:creationId xmlns:a16="http://schemas.microsoft.com/office/drawing/2014/main" id="{9A0E94B7-C54D-4F91-A2DB-2A914275199E}"/>
+              </a:ext>
+            </a:extLst>
+          </p:cNvPr>
+          <p:cNvPicPr>
+            <a:picLocks noChangeAspect="1"/>
+          </p:cNvPicPr>
+          <p:nvPr/>
+        </p:nvPicPr>
+        <p:blipFill>
+          <a:blip r:embed="rId2">
+            <a:extLst>
+              <a:ext uri="{28A0092B-C50C-407E-A947-70E740481C1C}">
+                <a14:useLocalDpi xmlns:a14="http://schemas.microsoft.com/office/drawing/2010/main" val="0"/>
+              </a:ext>
+            </a:extLst>
+          </a:blip>
+          <a:stretch>
+            <a:fillRect/>
+          </a:stretch>
+        </p:blipFill>
+        <p:spPr>
+          <a:xfrm>
+            <a:off x="136188" y="169443"/>
+            <a:ext cx="327769" cy="327769"/>
+          </a:xfrm>
+          <a:prstGeom prst="rect">
+            <a:avLst/>
+          </a:prstGeom>
+        </p:spPr>
+      </p:pic>
+      <p:sp>
+        <p:nvSpPr>
+          <p:cNvPr id="3" name="Rectangle 2">
+            <a:extLst>
+              <a:ext uri="{FF2B5EF4-FFF2-40B4-BE49-F238E27FC236}">
+                <a16:creationId xmlns:a16="http://schemas.microsoft.com/office/drawing/2014/main" id="{F5207A99-43FC-4CEA-B271-64C9BBA57EE2}"/>
+              </a:ext>
+            </a:extLst>
+          </p:cNvPr>
+          <p:cNvSpPr/>
+          <p:nvPr/>
+        </p:nvSpPr>
+        <p:spPr>
+          <a:xfrm>
+            <a:off x="0" y="666656"/>
+            <a:ext cx="12192000" cy="6191344"/>
+          </a:xfrm>
+          <a:prstGeom prst="rect">
+            <a:avLst/>
+          </a:prstGeom>
+          <a:solidFill>
+            <a:schemeClr val="tx1">
+              <a:lumMod val="85000"/>
+              <a:lumOff val="15000"/>
+            </a:schemeClr>
+          </a:solidFill>
+          <a:ln>
+            <a:noFill/>
+          </a:ln>
+        </p:spPr>
+        <p:style>
+          <a:lnRef idx="2">
+            <a:schemeClr val="accent1">
+              <a:shade val="50000"/>
+            </a:schemeClr>
+          </a:lnRef>
+          <a:fillRef idx="1">
+            <a:schemeClr val="accent1"/>
+          </a:fillRef>
+          <a:effectRef idx="0">
+            <a:schemeClr val="accent1"/>
+          </a:effectRef>
+          <a:fontRef idx="minor">
+            <a:schemeClr val="lt1"/>
+          </a:fontRef>
+        </p:style>
+        <p:txBody>
+          <a:bodyPr rtlCol="0" anchor="t"/>
+          <a:lstStyle/>
+          <a:p>
             <a:pPr marL="742950" lvl="1" indent="-285750">
               <a:lnSpc>
                 <a:spcPct val="150000"/>
@@ -9826,23 +10409,10 @@
               <a:buFont typeface="Wingdings" panose="05000000000000000000" pitchFamily="2" charset="2"/>
               <a:buChar char="§"/>
             </a:pPr>
-            <a:r>
-              <a:rPr lang="en-GB" sz="2400" dirty="0">
-                <a:solidFill>
-                  <a:srgbClr val="00B0F0"/>
-                </a:solidFill>
-                <a:latin typeface="Segoe UI Light" panose="020B0502040204020203" pitchFamily="34" charset="0"/>
-                <a:cs typeface="Segoe UI Light" panose="020B0502040204020203" pitchFamily="34" charset="0"/>
-              </a:rPr>
-              <a:t>for</a:t>
-            </a:r>
-            <a:r>
-              <a:rPr lang="en-GB" sz="2400" dirty="0">
-                <a:latin typeface="Segoe UI Light" panose="020B0502040204020203" pitchFamily="34" charset="0"/>
-                <a:cs typeface="Segoe UI Light" panose="020B0502040204020203" pitchFamily="34" charset="0"/>
-              </a:rPr>
-              <a:t> – a loop for iterating over a code block for a set number of times</a:t>
-            </a:r>
+            <a:endParaRPr lang="en-GB" sz="2400" dirty="0">
+              <a:latin typeface="Segoe UI Light" panose="020B0502040204020203" pitchFamily="34" charset="0"/>
+              <a:cs typeface="Segoe UI Light" panose="020B0502040204020203" pitchFamily="34" charset="0"/>
+            </a:endParaRPr>
           </a:p>
           <a:p>
             <a:pPr marL="742950" lvl="1" indent="-285750">
@@ -9853,21 +10423,21 @@
               <a:buChar char="§"/>
             </a:pPr>
             <a:r>
-              <a:rPr lang="en-GB" sz="2400" dirty="0">
+              <a:rPr lang="en-GB" sz="2400" dirty="0" err="1">
                 <a:solidFill>
                   <a:srgbClr val="00B0F0"/>
                 </a:solidFill>
                 <a:latin typeface="Segoe UI Light" panose="020B0502040204020203" pitchFamily="34" charset="0"/>
                 <a:cs typeface="Segoe UI Light" panose="020B0502040204020203" pitchFamily="34" charset="0"/>
               </a:rPr>
-              <a:t>foreach</a:t>
-            </a:r>
-            <a:r>
-              <a:rPr lang="en-GB" sz="2400" dirty="0">
-                <a:latin typeface="Segoe UI Light" panose="020B0502040204020203" pitchFamily="34" charset="0"/>
-                <a:cs typeface="Segoe UI Light" panose="020B0502040204020203" pitchFamily="34" charset="0"/>
-              </a:rPr>
-              <a:t> – a loop for iterating over enumerable types</a:t>
+              <a:t>var</a:t>
+            </a:r>
+            <a:r>
+              <a:rPr lang="en-GB" sz="2400" dirty="0">
+                <a:latin typeface="Segoe UI Light" panose="020B0502040204020203" pitchFamily="34" charset="0"/>
+                <a:cs typeface="Segoe UI Light" panose="020B0502040204020203" pitchFamily="34" charset="0"/>
+              </a:rPr>
+              <a:t> – used to declare an anonymous type (but is not restricted to anonymous types)</a:t>
             </a:r>
           </a:p>
           <a:p>
@@ -9886,14 +10456,14 @@
                 <a:latin typeface="Segoe UI Light" panose="020B0502040204020203" pitchFamily="34" charset="0"/>
                 <a:cs typeface="Segoe UI Light" panose="020B0502040204020203" pitchFamily="34" charset="0"/>
               </a:rPr>
-              <a:t>while</a:t>
-            </a:r>
-            <a:r>
-              <a:rPr lang="en-GB" sz="2400" dirty="0">
-                <a:latin typeface="Segoe UI Light" panose="020B0502040204020203" pitchFamily="34" charset="0"/>
-                <a:cs typeface="Segoe UI Light" panose="020B0502040204020203" pitchFamily="34" charset="0"/>
-              </a:rPr>
-              <a:t> – a loop for iterating until a condition is met</a:t>
+              <a:t>dynamic</a:t>
+            </a:r>
+            <a:r>
+              <a:rPr lang="en-GB" sz="2400" dirty="0">
+                <a:latin typeface="Segoe UI Light" panose="020B0502040204020203" pitchFamily="34" charset="0"/>
+                <a:cs typeface="Segoe UI Light" panose="020B0502040204020203" pitchFamily="34" charset="0"/>
+              </a:rPr>
+              <a:t> – declares a late-bound static type that bypasses static type checking</a:t>
             </a:r>
           </a:p>
           <a:p>
@@ -9912,14 +10482,14 @@
                 <a:latin typeface="Segoe UI Light" panose="020B0502040204020203" pitchFamily="34" charset="0"/>
                 <a:cs typeface="Segoe UI Light" panose="020B0502040204020203" pitchFamily="34" charset="0"/>
               </a:rPr>
-              <a:t>yield</a:t>
-            </a:r>
-            <a:r>
-              <a:rPr lang="en-GB" sz="2400" dirty="0">
-                <a:latin typeface="Segoe UI Light" panose="020B0502040204020203" pitchFamily="34" charset="0"/>
-                <a:cs typeface="Segoe UI Light" panose="020B0502040204020203" pitchFamily="34" charset="0"/>
-              </a:rPr>
-              <a:t> – creates an iterator state machine and defers execution of enumeration</a:t>
+              <a:t>throw</a:t>
+            </a:r>
+            <a:r>
+              <a:rPr lang="en-GB" sz="2400" dirty="0">
+                <a:latin typeface="Segoe UI Light" panose="020B0502040204020203" pitchFamily="34" charset="0"/>
+                <a:cs typeface="Segoe UI Light" panose="020B0502040204020203" pitchFamily="34" charset="0"/>
+              </a:rPr>
+              <a:t> – used to throw a custom exception from user code</a:t>
             </a:r>
           </a:p>
           <a:p>
@@ -9931,14 +10501,40 @@
               <a:buChar char="§"/>
             </a:pPr>
             <a:r>
-              <a:rPr lang="en-GB" sz="2400" dirty="0" err="1">
+              <a:rPr lang="en-GB" sz="2400" dirty="0">
                 <a:solidFill>
                   <a:srgbClr val="00B0F0"/>
                 </a:solidFill>
                 <a:latin typeface="Segoe UI Light" panose="020B0502040204020203" pitchFamily="34" charset="0"/>
                 <a:cs typeface="Segoe UI Light" panose="020B0502040204020203" pitchFamily="34" charset="0"/>
               </a:rPr>
-              <a:t>params</a:t>
+              <a:t>try</a:t>
+            </a:r>
+            <a:r>
+              <a:rPr lang="en-GB" sz="2400" dirty="0">
+                <a:latin typeface="Segoe UI Light" panose="020B0502040204020203" pitchFamily="34" charset="0"/>
+                <a:cs typeface="Segoe UI Light" panose="020B0502040204020203" pitchFamily="34" charset="0"/>
+              </a:rPr>
+              <a:t> – used to partition code that may throw an exception</a:t>
+            </a:r>
+          </a:p>
+          <a:p>
+            <a:pPr marL="742950" lvl="1" indent="-285750">
+              <a:lnSpc>
+                <a:spcPct val="150000"/>
+              </a:lnSpc>
+              <a:buFont typeface="Wingdings" panose="05000000000000000000" pitchFamily="2" charset="2"/>
+              <a:buChar char="§"/>
+            </a:pPr>
+            <a:r>
+              <a:rPr lang="en-GB" sz="2400" dirty="0">
+                <a:solidFill>
+                  <a:srgbClr val="00B0F0"/>
+                </a:solidFill>
+                <a:latin typeface="Segoe UI Light" panose="020B0502040204020203" pitchFamily="34" charset="0"/>
+                <a:cs typeface="Segoe UI Light" panose="020B0502040204020203" pitchFamily="34" charset="0"/>
+              </a:rPr>
+              <a:t>catch</a:t>
             </a:r>
             <a:r>
               <a:rPr lang="en-GB" sz="2400" dirty="0">
@@ -9948,17 +10544,46 @@
                 <a:latin typeface="Segoe UI Light" panose="020B0502040204020203" pitchFamily="34" charset="0"/>
                 <a:cs typeface="Segoe UI Light" panose="020B0502040204020203" pitchFamily="34" charset="0"/>
               </a:rPr>
-              <a:t> – allows </a:t>
-            </a:r>
-            <a:r>
-              <a:rPr lang="en-GB" sz="2400">
+              <a:t> – used to catch exceptions that are thrown by the runtime or by user code</a:t>
+            </a:r>
+          </a:p>
+          <a:p>
+            <a:pPr marL="742950" lvl="1" indent="-285750">
+              <a:lnSpc>
+                <a:spcPct val="150000"/>
+              </a:lnSpc>
+              <a:buFont typeface="Wingdings" panose="05000000000000000000" pitchFamily="2" charset="2"/>
+              <a:buChar char="§"/>
+            </a:pPr>
+            <a:r>
+              <a:rPr lang="en-GB" sz="2400" dirty="0">
+                <a:solidFill>
+                  <a:srgbClr val="00B0F0"/>
+                </a:solidFill>
+                <a:latin typeface="Segoe UI Light" panose="020B0502040204020203" pitchFamily="34" charset="0"/>
+                <a:cs typeface="Segoe UI Light" panose="020B0502040204020203" pitchFamily="34" charset="0"/>
+              </a:rPr>
+              <a:t>finally</a:t>
+            </a:r>
+            <a:r>
+              <a:rPr lang="en-GB" sz="2400" dirty="0">
                 <a:solidFill>
                   <a:schemeClr val="bg1"/>
                 </a:solidFill>
                 <a:latin typeface="Segoe UI Light" panose="020B0502040204020203" pitchFamily="34" charset="0"/>
                 <a:cs typeface="Segoe UI Light" panose="020B0502040204020203" pitchFamily="34" charset="0"/>
               </a:rPr>
-              <a:t>an array </a:t>
+              <a:t> – optional part of a </a:t>
+            </a:r>
+            <a:r>
+              <a:rPr lang="en-GB" sz="2400" dirty="0">
+                <a:solidFill>
+                  <a:srgbClr val="00B0F0"/>
+                </a:solidFill>
+                <a:latin typeface="Segoe UI Light" panose="020B0502040204020203" pitchFamily="34" charset="0"/>
+                <a:cs typeface="Segoe UI Light" panose="020B0502040204020203" pitchFamily="34" charset="0"/>
+              </a:rPr>
+              <a:t>try</a:t>
             </a:r>
             <a:r>
               <a:rPr lang="en-GB" sz="2400" dirty="0">
@@ -9968,7 +10593,27 @@
                 <a:latin typeface="Segoe UI Light" panose="020B0502040204020203" pitchFamily="34" charset="0"/>
                 <a:cs typeface="Segoe UI Light" panose="020B0502040204020203" pitchFamily="34" charset="0"/>
               </a:rPr>
-              <a:t>parameter to take a variable number of arguments</a:t>
+              <a:t>/</a:t>
+            </a:r>
+            <a:r>
+              <a:rPr lang="en-GB" sz="2400" dirty="0">
+                <a:solidFill>
+                  <a:srgbClr val="00B0F0"/>
+                </a:solidFill>
+                <a:latin typeface="Segoe UI Light" panose="020B0502040204020203" pitchFamily="34" charset="0"/>
+                <a:cs typeface="Segoe UI Light" panose="020B0502040204020203" pitchFamily="34" charset="0"/>
+              </a:rPr>
+              <a:t>catch</a:t>
+            </a:r>
+            <a:r>
+              <a:rPr lang="en-GB" sz="2400" dirty="0">
+                <a:solidFill>
+                  <a:schemeClr val="bg1"/>
+                </a:solidFill>
+                <a:latin typeface="Segoe UI Light" panose="020B0502040204020203" pitchFamily="34" charset="0"/>
+                <a:cs typeface="Segoe UI Light" panose="020B0502040204020203" pitchFamily="34" charset="0"/>
+              </a:rPr>
+              <a:t> block that is executed regardless of whether an exception was thrown in a try block</a:t>
             </a:r>
           </a:p>
         </p:txBody>
@@ -10283,6 +10928,22 @@
                 <a:cs typeface="Segoe UI Light" panose="020B0502040204020203" pitchFamily="34" charset="0"/>
               </a:rPr>
               <a:t>LINQ</a:t>
+            </a:r>
+          </a:p>
+          <a:p>
+            <a:pPr marL="742950" lvl="1" indent="-285750">
+              <a:lnSpc>
+                <a:spcPct val="150000"/>
+              </a:lnSpc>
+              <a:buFont typeface="Wingdings" panose="05000000000000000000" pitchFamily="2" charset="2"/>
+              <a:buChar char="§"/>
+            </a:pPr>
+            <a:r>
+              <a:rPr lang="en-GB" sz="2400" dirty="0">
+                <a:latin typeface="Segoe UI Light" panose="020B0502040204020203" pitchFamily="34" charset="0"/>
+                <a:cs typeface="Segoe UI Light" panose="020B0502040204020203" pitchFamily="34" charset="0"/>
+              </a:rPr>
+              <a:t>Keywords</a:t>
             </a:r>
           </a:p>
         </p:txBody>

</xml_diff>